<commit_message>
Box on head, awfully drawn bird
</commit_message>
<xml_diff>
--- a/sketchbook2.pptx
+++ b/sketchbook2.pptx
@@ -7,6 +7,11 @@
   <p:sldIdLst>
     <p:sldId id="256" r:id="rId2"/>
     <p:sldId id="257" r:id="rId3"/>
+    <p:sldId id="258" r:id="rId4"/>
+    <p:sldId id="259" r:id="rId5"/>
+    <p:sldId id="260" r:id="rId6"/>
+    <p:sldId id="261" r:id="rId7"/>
+    <p:sldId id="262" r:id="rId8"/>
   </p:sldIdLst>
   <p:sldSz cx="9144000" cy="6858000" type="screen4x3"/>
   <p:notesSz cx="6858000" cy="9144000"/>
@@ -289,7 +294,8 @@
           <a:p>
             <a:fld id="{A42C2479-E3BA-4ADA-A99C-BD38F112A80F}" type="datetimeFigureOut">
               <a:rPr lang="en-CA" smtClean="0"/>
-              <a:t>2014-03-20</a:t>
+              <a:pPr/>
+              <a:t>2014-04-22</a:t>
             </a:fld>
             <a:endParaRPr lang="en-CA"/>
           </a:p>
@@ -331,6 +337,7 @@
           <a:p>
             <a:fld id="{CD49B6D9-0192-477F-B4A0-6D440B27DDA7}" type="slidenum">
               <a:rPr lang="en-CA" smtClean="0"/>
+              <a:pPr/>
               <a:t>‹#›</a:t>
             </a:fld>
             <a:endParaRPr lang="en-CA"/>
@@ -454,7 +461,8 @@
           <a:p>
             <a:fld id="{A42C2479-E3BA-4ADA-A99C-BD38F112A80F}" type="datetimeFigureOut">
               <a:rPr lang="en-CA" smtClean="0"/>
-              <a:t>2014-03-20</a:t>
+              <a:pPr/>
+              <a:t>2014-04-22</a:t>
             </a:fld>
             <a:endParaRPr lang="en-CA"/>
           </a:p>
@@ -496,6 +504,7 @@
           <a:p>
             <a:fld id="{CD49B6D9-0192-477F-B4A0-6D440B27DDA7}" type="slidenum">
               <a:rPr lang="en-CA" smtClean="0"/>
+              <a:pPr/>
               <a:t>‹#›</a:t>
             </a:fld>
             <a:endParaRPr lang="en-CA"/>
@@ -629,7 +638,8 @@
           <a:p>
             <a:fld id="{A42C2479-E3BA-4ADA-A99C-BD38F112A80F}" type="datetimeFigureOut">
               <a:rPr lang="en-CA" smtClean="0"/>
-              <a:t>2014-03-20</a:t>
+              <a:pPr/>
+              <a:t>2014-04-22</a:t>
             </a:fld>
             <a:endParaRPr lang="en-CA"/>
           </a:p>
@@ -671,6 +681,7 @@
           <a:p>
             <a:fld id="{CD49B6D9-0192-477F-B4A0-6D440B27DDA7}" type="slidenum">
               <a:rPr lang="en-CA" smtClean="0"/>
+              <a:pPr/>
               <a:t>‹#›</a:t>
             </a:fld>
             <a:endParaRPr lang="en-CA"/>
@@ -794,7 +805,8 @@
           <a:p>
             <a:fld id="{A42C2479-E3BA-4ADA-A99C-BD38F112A80F}" type="datetimeFigureOut">
               <a:rPr lang="en-CA" smtClean="0"/>
-              <a:t>2014-03-20</a:t>
+              <a:pPr/>
+              <a:t>2014-04-22</a:t>
             </a:fld>
             <a:endParaRPr lang="en-CA"/>
           </a:p>
@@ -836,6 +848,7 @@
           <a:p>
             <a:fld id="{CD49B6D9-0192-477F-B4A0-6D440B27DDA7}" type="slidenum">
               <a:rPr lang="en-CA" smtClean="0"/>
+              <a:pPr/>
               <a:t>‹#›</a:t>
             </a:fld>
             <a:endParaRPr lang="en-CA"/>
@@ -1035,7 +1048,8 @@
           <a:p>
             <a:fld id="{A42C2479-E3BA-4ADA-A99C-BD38F112A80F}" type="datetimeFigureOut">
               <a:rPr lang="en-CA" smtClean="0"/>
-              <a:t>2014-03-20</a:t>
+              <a:pPr/>
+              <a:t>2014-04-22</a:t>
             </a:fld>
             <a:endParaRPr lang="en-CA"/>
           </a:p>
@@ -1077,6 +1091,7 @@
           <a:p>
             <a:fld id="{CD49B6D9-0192-477F-B4A0-6D440B27DDA7}" type="slidenum">
               <a:rPr lang="en-CA" smtClean="0"/>
+              <a:pPr/>
               <a:t>‹#›</a:t>
             </a:fld>
             <a:endParaRPr lang="en-CA"/>
@@ -1318,7 +1333,8 @@
           <a:p>
             <a:fld id="{A42C2479-E3BA-4ADA-A99C-BD38F112A80F}" type="datetimeFigureOut">
               <a:rPr lang="en-CA" smtClean="0"/>
-              <a:t>2014-03-20</a:t>
+              <a:pPr/>
+              <a:t>2014-04-22</a:t>
             </a:fld>
             <a:endParaRPr lang="en-CA"/>
           </a:p>
@@ -1360,6 +1376,7 @@
           <a:p>
             <a:fld id="{CD49B6D9-0192-477F-B4A0-6D440B27DDA7}" type="slidenum">
               <a:rPr lang="en-CA" smtClean="0"/>
+              <a:pPr/>
               <a:t>‹#›</a:t>
             </a:fld>
             <a:endParaRPr lang="en-CA"/>
@@ -1735,7 +1752,8 @@
           <a:p>
             <a:fld id="{A42C2479-E3BA-4ADA-A99C-BD38F112A80F}" type="datetimeFigureOut">
               <a:rPr lang="en-CA" smtClean="0"/>
-              <a:t>2014-03-20</a:t>
+              <a:pPr/>
+              <a:t>2014-04-22</a:t>
             </a:fld>
             <a:endParaRPr lang="en-CA"/>
           </a:p>
@@ -1777,6 +1795,7 @@
           <a:p>
             <a:fld id="{CD49B6D9-0192-477F-B4A0-6D440B27DDA7}" type="slidenum">
               <a:rPr lang="en-CA" smtClean="0"/>
+              <a:pPr/>
               <a:t>‹#›</a:t>
             </a:fld>
             <a:endParaRPr lang="en-CA"/>
@@ -1848,7 +1867,8 @@
           <a:p>
             <a:fld id="{A42C2479-E3BA-4ADA-A99C-BD38F112A80F}" type="datetimeFigureOut">
               <a:rPr lang="en-CA" smtClean="0"/>
-              <a:t>2014-03-20</a:t>
+              <a:pPr/>
+              <a:t>2014-04-22</a:t>
             </a:fld>
             <a:endParaRPr lang="en-CA"/>
           </a:p>
@@ -1890,6 +1910,7 @@
           <a:p>
             <a:fld id="{CD49B6D9-0192-477F-B4A0-6D440B27DDA7}" type="slidenum">
               <a:rPr lang="en-CA" smtClean="0"/>
+              <a:pPr/>
               <a:t>‹#›</a:t>
             </a:fld>
             <a:endParaRPr lang="en-CA"/>
@@ -1938,7 +1959,8 @@
           <a:p>
             <a:fld id="{A42C2479-E3BA-4ADA-A99C-BD38F112A80F}" type="datetimeFigureOut">
               <a:rPr lang="en-CA" smtClean="0"/>
-              <a:t>2014-03-20</a:t>
+              <a:pPr/>
+              <a:t>2014-04-22</a:t>
             </a:fld>
             <a:endParaRPr lang="en-CA"/>
           </a:p>
@@ -1980,6 +2002,7 @@
           <a:p>
             <a:fld id="{CD49B6D9-0192-477F-B4A0-6D440B27DDA7}" type="slidenum">
               <a:rPr lang="en-CA" smtClean="0"/>
+              <a:pPr/>
               <a:t>‹#›</a:t>
             </a:fld>
             <a:endParaRPr lang="en-CA"/>
@@ -2210,7 +2233,8 @@
           <a:p>
             <a:fld id="{A42C2479-E3BA-4ADA-A99C-BD38F112A80F}" type="datetimeFigureOut">
               <a:rPr lang="en-CA" smtClean="0"/>
-              <a:t>2014-03-20</a:t>
+              <a:pPr/>
+              <a:t>2014-04-22</a:t>
             </a:fld>
             <a:endParaRPr lang="en-CA"/>
           </a:p>
@@ -2252,6 +2276,7 @@
           <a:p>
             <a:fld id="{CD49B6D9-0192-477F-B4A0-6D440B27DDA7}" type="slidenum">
               <a:rPr lang="en-CA" smtClean="0"/>
+              <a:pPr/>
               <a:t>‹#›</a:t>
             </a:fld>
             <a:endParaRPr lang="en-CA"/>
@@ -2458,7 +2483,8 @@
           <a:p>
             <a:fld id="{A42C2479-E3BA-4ADA-A99C-BD38F112A80F}" type="datetimeFigureOut">
               <a:rPr lang="en-CA" smtClean="0"/>
-              <a:t>2014-03-20</a:t>
+              <a:pPr/>
+              <a:t>2014-04-22</a:t>
             </a:fld>
             <a:endParaRPr lang="en-CA"/>
           </a:p>
@@ -2500,6 +2526,7 @@
           <a:p>
             <a:fld id="{CD49B6D9-0192-477F-B4A0-6D440B27DDA7}" type="slidenum">
               <a:rPr lang="en-CA" smtClean="0"/>
+              <a:pPr/>
               <a:t>‹#›</a:t>
             </a:fld>
             <a:endParaRPr lang="en-CA"/>
@@ -2666,7 +2693,8 @@
           <a:p>
             <a:fld id="{A42C2479-E3BA-4ADA-A99C-BD38F112A80F}" type="datetimeFigureOut">
               <a:rPr lang="en-CA" smtClean="0"/>
-              <a:t>2014-03-20</a:t>
+              <a:pPr/>
+              <a:t>2014-04-22</a:t>
             </a:fld>
             <a:endParaRPr lang="en-CA"/>
           </a:p>
@@ -2744,6 +2772,7 @@
           <a:p>
             <a:fld id="{CD49B6D9-0192-477F-B4A0-6D440B27DDA7}" type="slidenum">
               <a:rPr lang="en-CA" smtClean="0"/>
+              <a:pPr/>
               <a:t>‹#›</a:t>
             </a:fld>
             <a:endParaRPr lang="en-CA"/>
@@ -3087,6 +3116,738 @@
 </file>
 
 <file path=ppt/slides/slide2.xml><?xml version="1.0" encoding="utf-8"?>
+<p:sld xmlns:a="http://schemas.openxmlformats.org/drawingml/2006/main" xmlns:r="http://schemas.openxmlformats.org/officeDocument/2006/relationships" xmlns:p="http://schemas.openxmlformats.org/presentationml/2006/main">
+  <p:cSld>
+    <p:spTree>
+      <p:nvGrpSpPr>
+        <p:cNvPr id="1" name=""/>
+        <p:cNvGrpSpPr/>
+        <p:nvPr/>
+      </p:nvGrpSpPr>
+      <p:grpSpPr>
+        <a:xfrm>
+          <a:off x="0" y="0"/>
+          <a:ext cx="0" cy="0"/>
+          <a:chOff x="0" y="0"/>
+          <a:chExt cx="0" cy="0"/>
+        </a:xfrm>
+      </p:grpSpPr>
+    </p:spTree>
+  </p:cSld>
+  <p:clrMapOvr>
+    <a:masterClrMapping/>
+  </p:clrMapOvr>
+  <p:timing>
+    <p:tnLst>
+      <p:par>
+        <p:cTn id="1" dur="indefinite" restart="never" nodeType="tmRoot"/>
+      </p:par>
+    </p:tnLst>
+  </p:timing>
+</p:sld>
+</file>
+
+<file path=ppt/slides/slide3.xml><?xml version="1.0" encoding="utf-8"?>
+<p:sld xmlns:a="http://schemas.openxmlformats.org/drawingml/2006/main" xmlns:r="http://schemas.openxmlformats.org/officeDocument/2006/relationships" xmlns:p="http://schemas.openxmlformats.org/presentationml/2006/main">
+  <p:cSld>
+    <p:spTree>
+      <p:nvGrpSpPr>
+        <p:cNvPr id="1" name=""/>
+        <p:cNvGrpSpPr/>
+        <p:nvPr/>
+      </p:nvGrpSpPr>
+      <p:grpSpPr>
+        <a:xfrm>
+          <a:off x="0" y="0"/>
+          <a:ext cx="0" cy="0"/>
+          <a:chOff x="0" y="0"/>
+          <a:chExt cx="0" cy="0"/>
+        </a:xfrm>
+      </p:grpSpPr>
+      <p:sp>
+        <p:nvSpPr>
+          <p:cNvPr id="2" name="Rectangle 1"/>
+          <p:cNvSpPr/>
+          <p:nvPr/>
+        </p:nvSpPr>
+        <p:spPr>
+          <a:xfrm>
+            <a:off x="5076056" y="0"/>
+            <a:ext cx="2088232" cy="692696"/>
+          </a:xfrm>
+          <a:prstGeom prst="rect">
+            <a:avLst/>
+          </a:prstGeom>
+          <a:solidFill>
+            <a:schemeClr val="tx1"/>
+          </a:solidFill>
+          <a:ln>
+            <a:noFill/>
+          </a:ln>
+        </p:spPr>
+        <p:style>
+          <a:lnRef idx="2">
+            <a:schemeClr val="accent6">
+              <a:shade val="50000"/>
+            </a:schemeClr>
+          </a:lnRef>
+          <a:fillRef idx="1">
+            <a:schemeClr val="accent6"/>
+          </a:fillRef>
+          <a:effectRef idx="0">
+            <a:schemeClr val="accent6"/>
+          </a:effectRef>
+          <a:fontRef idx="minor">
+            <a:schemeClr val="lt1"/>
+          </a:fontRef>
+        </p:style>
+        <p:txBody>
+          <a:bodyPr rtlCol="0" anchor="ctr"/>
+          <a:lstStyle/>
+          <a:p>
+            <a:pPr algn="ctr"/>
+            <a:endParaRPr lang="en-CA"/>
+          </a:p>
+        </p:txBody>
+      </p:sp>
+      <p:sp>
+        <p:nvSpPr>
+          <p:cNvPr id="3" name="Rectangle 2"/>
+          <p:cNvSpPr/>
+          <p:nvPr/>
+        </p:nvSpPr>
+        <p:spPr>
+          <a:xfrm>
+            <a:off x="5292080" y="548680"/>
+            <a:ext cx="864096" cy="3600400"/>
+          </a:xfrm>
+          <a:prstGeom prst="rect">
+            <a:avLst/>
+          </a:prstGeom>
+          <a:solidFill>
+            <a:schemeClr val="tx1"/>
+          </a:solidFill>
+          <a:ln>
+            <a:noFill/>
+          </a:ln>
+        </p:spPr>
+        <p:style>
+          <a:lnRef idx="2">
+            <a:schemeClr val="accent6">
+              <a:shade val="50000"/>
+            </a:schemeClr>
+          </a:lnRef>
+          <a:fillRef idx="1">
+            <a:schemeClr val="accent6"/>
+          </a:fillRef>
+          <a:effectRef idx="0">
+            <a:schemeClr val="accent6"/>
+          </a:effectRef>
+          <a:fontRef idx="minor">
+            <a:schemeClr val="lt1"/>
+          </a:fontRef>
+        </p:style>
+        <p:txBody>
+          <a:bodyPr rtlCol="0" anchor="ctr"/>
+          <a:lstStyle/>
+          <a:p>
+            <a:pPr algn="ctr"/>
+            <a:endParaRPr lang="en-CA"/>
+          </a:p>
+        </p:txBody>
+      </p:sp>
+      <p:sp>
+        <p:nvSpPr>
+          <p:cNvPr id="4" name="Rectangle 3"/>
+          <p:cNvSpPr/>
+          <p:nvPr/>
+        </p:nvSpPr>
+        <p:spPr>
+          <a:xfrm>
+            <a:off x="8460432" y="404664"/>
+            <a:ext cx="683568" cy="4032448"/>
+          </a:xfrm>
+          <a:prstGeom prst="rect">
+            <a:avLst/>
+          </a:prstGeom>
+          <a:solidFill>
+            <a:schemeClr val="tx1"/>
+          </a:solidFill>
+          <a:ln>
+            <a:noFill/>
+          </a:ln>
+        </p:spPr>
+        <p:style>
+          <a:lnRef idx="2">
+            <a:schemeClr val="accent6">
+              <a:shade val="50000"/>
+            </a:schemeClr>
+          </a:lnRef>
+          <a:fillRef idx="1">
+            <a:schemeClr val="accent6"/>
+          </a:fillRef>
+          <a:effectRef idx="0">
+            <a:schemeClr val="accent6"/>
+          </a:effectRef>
+          <a:fontRef idx="minor">
+            <a:schemeClr val="lt1"/>
+          </a:fontRef>
+        </p:style>
+        <p:txBody>
+          <a:bodyPr rtlCol="0" anchor="ctr"/>
+          <a:lstStyle/>
+          <a:p>
+            <a:pPr algn="ctr"/>
+            <a:endParaRPr lang="en-CA"/>
+          </a:p>
+        </p:txBody>
+      </p:sp>
+      <p:sp>
+        <p:nvSpPr>
+          <p:cNvPr id="5" name="Rectangle 4"/>
+          <p:cNvSpPr/>
+          <p:nvPr/>
+        </p:nvSpPr>
+        <p:spPr>
+          <a:xfrm rot="711069">
+            <a:off x="7067019" y="359872"/>
+            <a:ext cx="683568" cy="4032448"/>
+          </a:xfrm>
+          <a:prstGeom prst="rect">
+            <a:avLst/>
+          </a:prstGeom>
+          <a:solidFill>
+            <a:schemeClr val="tx1"/>
+          </a:solidFill>
+          <a:ln>
+            <a:noFill/>
+          </a:ln>
+        </p:spPr>
+        <p:style>
+          <a:lnRef idx="2">
+            <a:schemeClr val="accent6">
+              <a:shade val="50000"/>
+            </a:schemeClr>
+          </a:lnRef>
+          <a:fillRef idx="1">
+            <a:schemeClr val="accent6"/>
+          </a:fillRef>
+          <a:effectRef idx="0">
+            <a:schemeClr val="accent6"/>
+          </a:effectRef>
+          <a:fontRef idx="minor">
+            <a:schemeClr val="lt1"/>
+          </a:fontRef>
+        </p:style>
+        <p:txBody>
+          <a:bodyPr rtlCol="0" anchor="ctr"/>
+          <a:lstStyle/>
+          <a:p>
+            <a:pPr algn="ctr"/>
+            <a:endParaRPr lang="en-CA"/>
+          </a:p>
+        </p:txBody>
+      </p:sp>
+      <p:sp>
+        <p:nvSpPr>
+          <p:cNvPr id="6" name="Freeform 5"/>
+          <p:cNvSpPr/>
+          <p:nvPr/>
+        </p:nvSpPr>
+        <p:spPr>
+          <a:xfrm>
+            <a:off x="-7620" y="-53340"/>
+            <a:ext cx="3451860" cy="2514600"/>
+          </a:xfrm>
+          <a:custGeom>
+            <a:avLst/>
+            <a:gdLst>
+              <a:gd name="connsiteX0" fmla="*/ 45720 w 3451860"/>
+              <a:gd name="connsiteY0" fmla="*/ 0 h 2514600"/>
+              <a:gd name="connsiteX1" fmla="*/ 3451860 w 3451860"/>
+              <a:gd name="connsiteY1" fmla="*/ 22860 h 2514600"/>
+              <a:gd name="connsiteX2" fmla="*/ 1562100 w 3451860"/>
+              <a:gd name="connsiteY2" fmla="*/ 2514600 h 2514600"/>
+              <a:gd name="connsiteX3" fmla="*/ 1600200 w 3451860"/>
+              <a:gd name="connsiteY3" fmla="*/ 1714500 h 2514600"/>
+              <a:gd name="connsiteX4" fmla="*/ 1973580 w 3451860"/>
+              <a:gd name="connsiteY4" fmla="*/ 1417320 h 2514600"/>
+              <a:gd name="connsiteX5" fmla="*/ 1889760 w 3451860"/>
+              <a:gd name="connsiteY5" fmla="*/ 426720 h 2514600"/>
+              <a:gd name="connsiteX6" fmla="*/ 1188720 w 3451860"/>
+              <a:gd name="connsiteY6" fmla="*/ 411480 h 2514600"/>
+              <a:gd name="connsiteX7" fmla="*/ 15240 w 3451860"/>
+              <a:gd name="connsiteY7" fmla="*/ 525780 h 2514600"/>
+              <a:gd name="connsiteX8" fmla="*/ 0 w 3451860"/>
+              <a:gd name="connsiteY8" fmla="*/ 22860 h 2514600"/>
+            </a:gdLst>
+            <a:ahLst/>
+            <a:cxnLst>
+              <a:cxn ang="0">
+                <a:pos x="connsiteX0" y="connsiteY0"/>
+              </a:cxn>
+              <a:cxn ang="0">
+                <a:pos x="connsiteX1" y="connsiteY1"/>
+              </a:cxn>
+              <a:cxn ang="0">
+                <a:pos x="connsiteX2" y="connsiteY2"/>
+              </a:cxn>
+              <a:cxn ang="0">
+                <a:pos x="connsiteX3" y="connsiteY3"/>
+              </a:cxn>
+              <a:cxn ang="0">
+                <a:pos x="connsiteX4" y="connsiteY4"/>
+              </a:cxn>
+              <a:cxn ang="0">
+                <a:pos x="connsiteX5" y="connsiteY5"/>
+              </a:cxn>
+              <a:cxn ang="0">
+                <a:pos x="connsiteX6" y="connsiteY6"/>
+              </a:cxn>
+              <a:cxn ang="0">
+                <a:pos x="connsiteX7" y="connsiteY7"/>
+              </a:cxn>
+              <a:cxn ang="0">
+                <a:pos x="connsiteX8" y="connsiteY8"/>
+              </a:cxn>
+            </a:cxnLst>
+            <a:rect l="l" t="t" r="r" b="b"/>
+            <a:pathLst>
+              <a:path w="3451860" h="2514600">
+                <a:moveTo>
+                  <a:pt x="45720" y="0"/>
+                </a:moveTo>
+                <a:lnTo>
+                  <a:pt x="3451860" y="22860"/>
+                </a:lnTo>
+                <a:lnTo>
+                  <a:pt x="1562100" y="2514600"/>
+                </a:lnTo>
+                <a:lnTo>
+                  <a:pt x="1600200" y="1714500"/>
+                </a:lnTo>
+                <a:lnTo>
+                  <a:pt x="1973580" y="1417320"/>
+                </a:lnTo>
+                <a:lnTo>
+                  <a:pt x="1889760" y="426720"/>
+                </a:lnTo>
+                <a:lnTo>
+                  <a:pt x="1188720" y="411480"/>
+                </a:lnTo>
+                <a:lnTo>
+                  <a:pt x="15240" y="525780"/>
+                </a:lnTo>
+                <a:lnTo>
+                  <a:pt x="0" y="22860"/>
+                </a:lnTo>
+              </a:path>
+            </a:pathLst>
+          </a:custGeom>
+          <a:solidFill>
+            <a:schemeClr val="tx1"/>
+          </a:solidFill>
+          <a:ln>
+            <a:solidFill>
+              <a:schemeClr val="bg1"/>
+            </a:solidFill>
+          </a:ln>
+        </p:spPr>
+        <p:style>
+          <a:lnRef idx="1">
+            <a:schemeClr val="accent1"/>
+          </a:lnRef>
+          <a:fillRef idx="0">
+            <a:schemeClr val="accent1"/>
+          </a:fillRef>
+          <a:effectRef idx="0">
+            <a:schemeClr val="accent1"/>
+          </a:effectRef>
+          <a:fontRef idx="minor">
+            <a:schemeClr val="tx1"/>
+          </a:fontRef>
+        </p:style>
+        <p:txBody>
+          <a:bodyPr rtlCol="0" anchor="ctr"/>
+          <a:lstStyle/>
+          <a:p>
+            <a:pPr algn="ctr"/>
+            <a:endParaRPr lang="en-CA"/>
+          </a:p>
+        </p:txBody>
+      </p:sp>
+      <p:sp>
+        <p:nvSpPr>
+          <p:cNvPr id="8" name="Freeform 7"/>
+          <p:cNvSpPr/>
+          <p:nvPr/>
+        </p:nvSpPr>
+        <p:spPr>
+          <a:xfrm>
+            <a:off x="5113020" y="4191000"/>
+            <a:ext cx="4069080" cy="2842260"/>
+          </a:xfrm>
+          <a:custGeom>
+            <a:avLst/>
+            <a:gdLst>
+              <a:gd name="connsiteX0" fmla="*/ 60960 w 4069080"/>
+              <a:gd name="connsiteY0" fmla="*/ 0 h 2842260"/>
+              <a:gd name="connsiteX1" fmla="*/ 60960 w 4069080"/>
+              <a:gd name="connsiteY1" fmla="*/ 0 h 2842260"/>
+              <a:gd name="connsiteX2" fmla="*/ 213360 w 4069080"/>
+              <a:gd name="connsiteY2" fmla="*/ 0 h 2842260"/>
+              <a:gd name="connsiteX3" fmla="*/ 4030980 w 4069080"/>
+              <a:gd name="connsiteY3" fmla="*/ 236220 h 2842260"/>
+              <a:gd name="connsiteX4" fmla="*/ 4069080 w 4069080"/>
+              <a:gd name="connsiteY4" fmla="*/ 2842260 h 2842260"/>
+              <a:gd name="connsiteX5" fmla="*/ 2148840 w 4069080"/>
+              <a:gd name="connsiteY5" fmla="*/ 2659380 h 2842260"/>
+              <a:gd name="connsiteX6" fmla="*/ 1013460 w 4069080"/>
+              <a:gd name="connsiteY6" fmla="*/ 967740 h 2842260"/>
+              <a:gd name="connsiteX7" fmla="*/ 15240 w 4069080"/>
+              <a:gd name="connsiteY7" fmla="*/ 739140 h 2842260"/>
+              <a:gd name="connsiteX8" fmla="*/ 0 w 4069080"/>
+              <a:gd name="connsiteY8" fmla="*/ 68580 h 2842260"/>
+              <a:gd name="connsiteX9" fmla="*/ 205740 w 4069080"/>
+              <a:gd name="connsiteY9" fmla="*/ 7620 h 2842260"/>
+            </a:gdLst>
+            <a:ahLst/>
+            <a:cxnLst>
+              <a:cxn ang="0">
+                <a:pos x="connsiteX0" y="connsiteY0"/>
+              </a:cxn>
+              <a:cxn ang="0">
+                <a:pos x="connsiteX1" y="connsiteY1"/>
+              </a:cxn>
+              <a:cxn ang="0">
+                <a:pos x="connsiteX2" y="connsiteY2"/>
+              </a:cxn>
+              <a:cxn ang="0">
+                <a:pos x="connsiteX3" y="connsiteY3"/>
+              </a:cxn>
+              <a:cxn ang="0">
+                <a:pos x="connsiteX4" y="connsiteY4"/>
+              </a:cxn>
+              <a:cxn ang="0">
+                <a:pos x="connsiteX5" y="connsiteY5"/>
+              </a:cxn>
+              <a:cxn ang="0">
+                <a:pos x="connsiteX6" y="connsiteY6"/>
+              </a:cxn>
+              <a:cxn ang="0">
+                <a:pos x="connsiteX7" y="connsiteY7"/>
+              </a:cxn>
+              <a:cxn ang="0">
+                <a:pos x="connsiteX8" y="connsiteY8"/>
+              </a:cxn>
+              <a:cxn ang="0">
+                <a:pos x="connsiteX9" y="connsiteY9"/>
+              </a:cxn>
+            </a:cxnLst>
+            <a:rect l="l" t="t" r="r" b="b"/>
+            <a:pathLst>
+              <a:path w="4069080" h="2842260">
+                <a:moveTo>
+                  <a:pt x="60960" y="0"/>
+                </a:moveTo>
+                <a:lnTo>
+                  <a:pt x="60960" y="0"/>
+                </a:lnTo>
+                <a:lnTo>
+                  <a:pt x="213360" y="0"/>
+                </a:lnTo>
+                <a:lnTo>
+                  <a:pt x="4030980" y="236220"/>
+                </a:lnTo>
+                <a:lnTo>
+                  <a:pt x="4069080" y="2842260"/>
+                </a:lnTo>
+                <a:lnTo>
+                  <a:pt x="2148840" y="2659380"/>
+                </a:lnTo>
+                <a:lnTo>
+                  <a:pt x="1013460" y="967740"/>
+                </a:lnTo>
+                <a:lnTo>
+                  <a:pt x="15240" y="739140"/>
+                </a:lnTo>
+                <a:lnTo>
+                  <a:pt x="0" y="68580"/>
+                </a:lnTo>
+                <a:lnTo>
+                  <a:pt x="205740" y="7620"/>
+                </a:lnTo>
+              </a:path>
+            </a:pathLst>
+          </a:custGeom>
+          <a:solidFill>
+            <a:schemeClr val="tx1">
+              <a:lumMod val="65000"/>
+              <a:lumOff val="35000"/>
+            </a:schemeClr>
+          </a:solidFill>
+        </p:spPr>
+        <p:style>
+          <a:lnRef idx="1">
+            <a:schemeClr val="accent1"/>
+          </a:lnRef>
+          <a:fillRef idx="0">
+            <a:schemeClr val="accent1"/>
+          </a:fillRef>
+          <a:effectRef idx="0">
+            <a:schemeClr val="accent1"/>
+          </a:effectRef>
+          <a:fontRef idx="minor">
+            <a:schemeClr val="tx1"/>
+          </a:fontRef>
+        </p:style>
+        <p:txBody>
+          <a:bodyPr rtlCol="0" anchor="ctr"/>
+          <a:lstStyle/>
+          <a:p>
+            <a:pPr algn="ctr"/>
+            <a:endParaRPr lang="en-CA"/>
+          </a:p>
+        </p:txBody>
+      </p:sp>
+      <p:sp>
+        <p:nvSpPr>
+          <p:cNvPr id="9" name="Freeform 8"/>
+          <p:cNvSpPr/>
+          <p:nvPr/>
+        </p:nvSpPr>
+        <p:spPr>
+          <a:xfrm>
+            <a:off x="1371600" y="3238500"/>
+            <a:ext cx="883920" cy="2118360"/>
+          </a:xfrm>
+          <a:custGeom>
+            <a:avLst/>
+            <a:gdLst>
+              <a:gd name="connsiteX0" fmla="*/ 129540 w 883920"/>
+              <a:gd name="connsiteY0" fmla="*/ 106680 h 2118360"/>
+              <a:gd name="connsiteX1" fmla="*/ 0 w 883920"/>
+              <a:gd name="connsiteY1" fmla="*/ 2080260 h 2118360"/>
+              <a:gd name="connsiteX2" fmla="*/ 883920 w 883920"/>
+              <a:gd name="connsiteY2" fmla="*/ 2118360 h 2118360"/>
+              <a:gd name="connsiteX3" fmla="*/ 769620 w 883920"/>
+              <a:gd name="connsiteY3" fmla="*/ 0 h 2118360"/>
+              <a:gd name="connsiteX4" fmla="*/ 30480 w 883920"/>
+              <a:gd name="connsiteY4" fmla="*/ 68580 h 2118360"/>
+            </a:gdLst>
+            <a:ahLst/>
+            <a:cxnLst>
+              <a:cxn ang="0">
+                <a:pos x="connsiteX0" y="connsiteY0"/>
+              </a:cxn>
+              <a:cxn ang="0">
+                <a:pos x="connsiteX1" y="connsiteY1"/>
+              </a:cxn>
+              <a:cxn ang="0">
+                <a:pos x="connsiteX2" y="connsiteY2"/>
+              </a:cxn>
+              <a:cxn ang="0">
+                <a:pos x="connsiteX3" y="connsiteY3"/>
+              </a:cxn>
+              <a:cxn ang="0">
+                <a:pos x="connsiteX4" y="connsiteY4"/>
+              </a:cxn>
+            </a:cxnLst>
+            <a:rect l="l" t="t" r="r" b="b"/>
+            <a:pathLst>
+              <a:path w="883920" h="2118360">
+                <a:moveTo>
+                  <a:pt x="129540" y="106680"/>
+                </a:moveTo>
+                <a:lnTo>
+                  <a:pt x="0" y="2080260"/>
+                </a:lnTo>
+                <a:lnTo>
+                  <a:pt x="883920" y="2118360"/>
+                </a:lnTo>
+                <a:lnTo>
+                  <a:pt x="769620" y="0"/>
+                </a:lnTo>
+                <a:lnTo>
+                  <a:pt x="30480" y="68580"/>
+                </a:lnTo>
+              </a:path>
+            </a:pathLst>
+          </a:custGeom>
+          <a:solidFill>
+            <a:schemeClr val="tx1"/>
+          </a:solidFill>
+        </p:spPr>
+        <p:style>
+          <a:lnRef idx="1">
+            <a:schemeClr val="accent1"/>
+          </a:lnRef>
+          <a:fillRef idx="0">
+            <a:schemeClr val="accent1"/>
+          </a:fillRef>
+          <a:effectRef idx="0">
+            <a:schemeClr val="accent1"/>
+          </a:effectRef>
+          <a:fontRef idx="minor">
+            <a:schemeClr val="tx1"/>
+          </a:fontRef>
+        </p:style>
+        <p:txBody>
+          <a:bodyPr rtlCol="0" anchor="ctr"/>
+          <a:lstStyle/>
+          <a:p>
+            <a:pPr algn="ctr"/>
+            <a:endParaRPr lang="en-CA"/>
+          </a:p>
+        </p:txBody>
+      </p:sp>
+      <p:sp>
+        <p:nvSpPr>
+          <p:cNvPr id="11" name="TextBox 10"/>
+          <p:cNvSpPr txBox="1"/>
+          <p:nvPr/>
+        </p:nvSpPr>
+        <p:spPr>
+          <a:xfrm>
+            <a:off x="3707904" y="5013176"/>
+            <a:ext cx="1044624" cy="338554"/>
+          </a:xfrm>
+          <a:prstGeom prst="rect">
+            <a:avLst/>
+          </a:prstGeom>
+          <a:noFill/>
+        </p:spPr>
+        <p:txBody>
+          <a:bodyPr wrap="square" rtlCol="0">
+            <a:spAutoFit/>
+          </a:bodyPr>
+          <a:lstStyle/>
+          <a:p>
+            <a:pPr algn="ctr"/>
+            <a:r>
+              <a:rPr lang="en-CA" sz="800" dirty="0" smtClean="0">
+                <a:latin typeface="Comic Sans MS" pitchFamily="66" charset="0"/>
+              </a:rPr>
+              <a:t>Do not go down slide headfirst</a:t>
+            </a:r>
+            <a:endParaRPr lang="en-CA" sz="800" dirty="0">
+              <a:latin typeface="Comic Sans MS" pitchFamily="66" charset="0"/>
+            </a:endParaRPr>
+          </a:p>
+        </p:txBody>
+      </p:sp>
+    </p:spTree>
+  </p:cSld>
+  <p:clrMapOvr>
+    <a:masterClrMapping/>
+  </p:clrMapOvr>
+  <p:timing>
+    <p:tnLst>
+      <p:par>
+        <p:cTn id="1" dur="indefinite" restart="never" nodeType="tmRoot"/>
+      </p:par>
+    </p:tnLst>
+  </p:timing>
+</p:sld>
+</file>
+
+<file path=ppt/slides/slide4.xml><?xml version="1.0" encoding="utf-8"?>
+<p:sld xmlns:a="http://schemas.openxmlformats.org/drawingml/2006/main" xmlns:r="http://schemas.openxmlformats.org/officeDocument/2006/relationships" xmlns:p="http://schemas.openxmlformats.org/presentationml/2006/main">
+  <p:cSld>
+    <p:spTree>
+      <p:nvGrpSpPr>
+        <p:cNvPr id="1" name=""/>
+        <p:cNvGrpSpPr/>
+        <p:nvPr/>
+      </p:nvGrpSpPr>
+      <p:grpSpPr>
+        <a:xfrm>
+          <a:off x="0" y="0"/>
+          <a:ext cx="0" cy="0"/>
+          <a:chOff x="0" y="0"/>
+          <a:chExt cx="0" cy="0"/>
+        </a:xfrm>
+      </p:grpSpPr>
+    </p:spTree>
+  </p:cSld>
+  <p:clrMapOvr>
+    <a:masterClrMapping/>
+  </p:clrMapOvr>
+  <p:timing>
+    <p:tnLst>
+      <p:par>
+        <p:cTn id="1" dur="indefinite" restart="never" nodeType="tmRoot"/>
+      </p:par>
+    </p:tnLst>
+  </p:timing>
+</p:sld>
+</file>
+
+<file path=ppt/slides/slide5.xml><?xml version="1.0" encoding="utf-8"?>
+<p:sld xmlns:a="http://schemas.openxmlformats.org/drawingml/2006/main" xmlns:r="http://schemas.openxmlformats.org/officeDocument/2006/relationships" xmlns:p="http://schemas.openxmlformats.org/presentationml/2006/main">
+  <p:cSld>
+    <p:spTree>
+      <p:nvGrpSpPr>
+        <p:cNvPr id="1" name=""/>
+        <p:cNvGrpSpPr/>
+        <p:nvPr/>
+      </p:nvGrpSpPr>
+      <p:grpSpPr>
+        <a:xfrm>
+          <a:off x="0" y="0"/>
+          <a:ext cx="0" cy="0"/>
+          <a:chOff x="0" y="0"/>
+          <a:chExt cx="0" cy="0"/>
+        </a:xfrm>
+      </p:grpSpPr>
+    </p:spTree>
+  </p:cSld>
+  <p:clrMapOvr>
+    <a:masterClrMapping/>
+  </p:clrMapOvr>
+  <p:timing>
+    <p:tnLst>
+      <p:par>
+        <p:cTn id="1" dur="indefinite" restart="never" nodeType="tmRoot"/>
+      </p:par>
+    </p:tnLst>
+  </p:timing>
+</p:sld>
+</file>
+
+<file path=ppt/slides/slide6.xml><?xml version="1.0" encoding="utf-8"?>
+<p:sld xmlns:a="http://schemas.openxmlformats.org/drawingml/2006/main" xmlns:r="http://schemas.openxmlformats.org/officeDocument/2006/relationships" xmlns:p="http://schemas.openxmlformats.org/presentationml/2006/main">
+  <p:cSld>
+    <p:spTree>
+      <p:nvGrpSpPr>
+        <p:cNvPr id="1" name=""/>
+        <p:cNvGrpSpPr/>
+        <p:nvPr/>
+      </p:nvGrpSpPr>
+      <p:grpSpPr>
+        <a:xfrm>
+          <a:off x="0" y="0"/>
+          <a:ext cx="0" cy="0"/>
+          <a:chOff x="0" y="0"/>
+          <a:chExt cx="0" cy="0"/>
+        </a:xfrm>
+      </p:grpSpPr>
+    </p:spTree>
+  </p:cSld>
+  <p:clrMapOvr>
+    <a:masterClrMapping/>
+  </p:clrMapOvr>
+  <p:timing>
+    <p:tnLst>
+      <p:par>
+        <p:cTn id="1" dur="indefinite" restart="never" nodeType="tmRoot"/>
+      </p:par>
+    </p:tnLst>
+  </p:timing>
+</p:sld>
+</file>
+
+<file path=ppt/slides/slide7.xml><?xml version="1.0" encoding="utf-8"?>
 <p:sld xmlns:a="http://schemas.openxmlformats.org/drawingml/2006/main" xmlns:r="http://schemas.openxmlformats.org/officeDocument/2006/relationships" xmlns:p="http://schemas.openxmlformats.org/presentationml/2006/main">
   <p:cSld>
     <p:spTree>

</xml_diff>

<commit_message>
Ruby on Rails, Wall-E
</commit_message>
<xml_diff>
--- a/sketchbook2.pptx
+++ b/sketchbook2.pptx
@@ -12,6 +12,9 @@
     <p:sldId id="260" r:id="rId6"/>
     <p:sldId id="261" r:id="rId7"/>
     <p:sldId id="262" r:id="rId8"/>
+    <p:sldId id="263" r:id="rId9"/>
+    <p:sldId id="264" r:id="rId10"/>
+    <p:sldId id="265" r:id="rId11"/>
   </p:sldIdLst>
   <p:sldSz cx="9144000" cy="6858000" type="screen4x3"/>
   <p:notesSz cx="6858000" cy="9144000"/>
@@ -295,7 +298,7 @@
             <a:fld id="{A42C2479-E3BA-4ADA-A99C-BD38F112A80F}" type="datetimeFigureOut">
               <a:rPr lang="en-CA" smtClean="0"/>
               <a:pPr/>
-              <a:t>2014-04-22</a:t>
+              <a:t>2014-05-05</a:t>
             </a:fld>
             <a:endParaRPr lang="en-CA"/>
           </a:p>
@@ -462,7 +465,7 @@
             <a:fld id="{A42C2479-E3BA-4ADA-A99C-BD38F112A80F}" type="datetimeFigureOut">
               <a:rPr lang="en-CA" smtClean="0"/>
               <a:pPr/>
-              <a:t>2014-04-22</a:t>
+              <a:t>2014-05-05</a:t>
             </a:fld>
             <a:endParaRPr lang="en-CA"/>
           </a:p>
@@ -639,7 +642,7 @@
             <a:fld id="{A42C2479-E3BA-4ADA-A99C-BD38F112A80F}" type="datetimeFigureOut">
               <a:rPr lang="en-CA" smtClean="0"/>
               <a:pPr/>
-              <a:t>2014-04-22</a:t>
+              <a:t>2014-05-05</a:t>
             </a:fld>
             <a:endParaRPr lang="en-CA"/>
           </a:p>
@@ -806,7 +809,7 @@
             <a:fld id="{A42C2479-E3BA-4ADA-A99C-BD38F112A80F}" type="datetimeFigureOut">
               <a:rPr lang="en-CA" smtClean="0"/>
               <a:pPr/>
-              <a:t>2014-04-22</a:t>
+              <a:t>2014-05-05</a:t>
             </a:fld>
             <a:endParaRPr lang="en-CA"/>
           </a:p>
@@ -1049,7 +1052,7 @@
             <a:fld id="{A42C2479-E3BA-4ADA-A99C-BD38F112A80F}" type="datetimeFigureOut">
               <a:rPr lang="en-CA" smtClean="0"/>
               <a:pPr/>
-              <a:t>2014-04-22</a:t>
+              <a:t>2014-05-05</a:t>
             </a:fld>
             <a:endParaRPr lang="en-CA"/>
           </a:p>
@@ -1334,7 +1337,7 @@
             <a:fld id="{A42C2479-E3BA-4ADA-A99C-BD38F112A80F}" type="datetimeFigureOut">
               <a:rPr lang="en-CA" smtClean="0"/>
               <a:pPr/>
-              <a:t>2014-04-22</a:t>
+              <a:t>2014-05-05</a:t>
             </a:fld>
             <a:endParaRPr lang="en-CA"/>
           </a:p>
@@ -1753,7 +1756,7 @@
             <a:fld id="{A42C2479-E3BA-4ADA-A99C-BD38F112A80F}" type="datetimeFigureOut">
               <a:rPr lang="en-CA" smtClean="0"/>
               <a:pPr/>
-              <a:t>2014-04-22</a:t>
+              <a:t>2014-05-05</a:t>
             </a:fld>
             <a:endParaRPr lang="en-CA"/>
           </a:p>
@@ -1868,7 +1871,7 @@
             <a:fld id="{A42C2479-E3BA-4ADA-A99C-BD38F112A80F}" type="datetimeFigureOut">
               <a:rPr lang="en-CA" smtClean="0"/>
               <a:pPr/>
-              <a:t>2014-04-22</a:t>
+              <a:t>2014-05-05</a:t>
             </a:fld>
             <a:endParaRPr lang="en-CA"/>
           </a:p>
@@ -1960,7 +1963,7 @@
             <a:fld id="{A42C2479-E3BA-4ADA-A99C-BD38F112A80F}" type="datetimeFigureOut">
               <a:rPr lang="en-CA" smtClean="0"/>
               <a:pPr/>
-              <a:t>2014-04-22</a:t>
+              <a:t>2014-05-05</a:t>
             </a:fld>
             <a:endParaRPr lang="en-CA"/>
           </a:p>
@@ -2234,7 +2237,7 @@
             <a:fld id="{A42C2479-E3BA-4ADA-A99C-BD38F112A80F}" type="datetimeFigureOut">
               <a:rPr lang="en-CA" smtClean="0"/>
               <a:pPr/>
-              <a:t>2014-04-22</a:t>
+              <a:t>2014-05-05</a:t>
             </a:fld>
             <a:endParaRPr lang="en-CA"/>
           </a:p>
@@ -2484,7 +2487,7 @@
             <a:fld id="{A42C2479-E3BA-4ADA-A99C-BD38F112A80F}" type="datetimeFigureOut">
               <a:rPr lang="en-CA" smtClean="0"/>
               <a:pPr/>
-              <a:t>2014-04-22</a:t>
+              <a:t>2014-05-05</a:t>
             </a:fld>
             <a:endParaRPr lang="en-CA"/>
           </a:p>
@@ -2694,7 +2697,7 @@
             <a:fld id="{A42C2479-E3BA-4ADA-A99C-BD38F112A80F}" type="datetimeFigureOut">
               <a:rPr lang="en-CA" smtClean="0"/>
               <a:pPr/>
-              <a:t>2014-04-22</a:t>
+              <a:t>2014-05-05</a:t>
             </a:fld>
             <a:endParaRPr lang="en-CA"/>
           </a:p>
@@ -3115,6 +3118,38 @@
 </p:sld>
 </file>
 
+<file path=ppt/slides/slide10.xml><?xml version="1.0" encoding="utf-8"?>
+<p:sld xmlns:a="http://schemas.openxmlformats.org/drawingml/2006/main" xmlns:r="http://schemas.openxmlformats.org/officeDocument/2006/relationships" xmlns:p="http://schemas.openxmlformats.org/presentationml/2006/main">
+  <p:cSld>
+    <p:spTree>
+      <p:nvGrpSpPr>
+        <p:cNvPr id="1" name=""/>
+        <p:cNvGrpSpPr/>
+        <p:nvPr/>
+      </p:nvGrpSpPr>
+      <p:grpSpPr>
+        <a:xfrm>
+          <a:off x="0" y="0"/>
+          <a:ext cx="0" cy="0"/>
+          <a:chOff x="0" y="0"/>
+          <a:chExt cx="0" cy="0"/>
+        </a:xfrm>
+      </p:grpSpPr>
+    </p:spTree>
+  </p:cSld>
+  <p:clrMapOvr>
+    <a:masterClrMapping/>
+  </p:clrMapOvr>
+  <p:timing>
+    <p:tnLst>
+      <p:par>
+        <p:cTn id="1" dur="indefinite" restart="never" nodeType="tmRoot"/>
+      </p:par>
+    </p:tnLst>
+  </p:timing>
+</p:sld>
+</file>
+
 <file path=ppt/slides/slide2.xml><?xml version="1.0" encoding="utf-8"?>
 <p:sld xmlns:a="http://schemas.openxmlformats.org/drawingml/2006/main" xmlns:r="http://schemas.openxmlformats.org/officeDocument/2006/relationships" xmlns:p="http://schemas.openxmlformats.org/presentationml/2006/main">
   <p:cSld>
@@ -3864,6 +3899,94 @@
           <a:chExt cx="0" cy="0"/>
         </a:xfrm>
       </p:grpSpPr>
+    </p:spTree>
+  </p:cSld>
+  <p:clrMapOvr>
+    <a:masterClrMapping/>
+  </p:clrMapOvr>
+  <p:timing>
+    <p:tnLst>
+      <p:par>
+        <p:cTn id="1" dur="indefinite" restart="never" nodeType="tmRoot"/>
+      </p:par>
+    </p:tnLst>
+  </p:timing>
+</p:sld>
+</file>
+
+<file path=ppt/slides/slide8.xml><?xml version="1.0" encoding="utf-8"?>
+<p:sld xmlns:a="http://schemas.openxmlformats.org/drawingml/2006/main" xmlns:r="http://schemas.openxmlformats.org/officeDocument/2006/relationships" xmlns:p="http://schemas.openxmlformats.org/presentationml/2006/main">
+  <p:cSld>
+    <p:spTree>
+      <p:nvGrpSpPr>
+        <p:cNvPr id="1" name=""/>
+        <p:cNvGrpSpPr/>
+        <p:nvPr/>
+      </p:nvGrpSpPr>
+      <p:grpSpPr>
+        <a:xfrm>
+          <a:off x="0" y="0"/>
+          <a:ext cx="0" cy="0"/>
+          <a:chOff x="0" y="0"/>
+          <a:chExt cx="0" cy="0"/>
+        </a:xfrm>
+      </p:grpSpPr>
+    </p:spTree>
+  </p:cSld>
+  <p:clrMapOvr>
+    <a:masterClrMapping/>
+  </p:clrMapOvr>
+  <p:timing>
+    <p:tnLst>
+      <p:par>
+        <p:cTn id="1" dur="indefinite" restart="never" nodeType="tmRoot"/>
+      </p:par>
+    </p:tnLst>
+  </p:timing>
+</p:sld>
+</file>
+
+<file path=ppt/slides/slide9.xml><?xml version="1.0" encoding="utf-8"?>
+<p:sld xmlns:a="http://schemas.openxmlformats.org/drawingml/2006/main" xmlns:r="http://schemas.openxmlformats.org/officeDocument/2006/relationships" xmlns:p="http://schemas.openxmlformats.org/presentationml/2006/main">
+  <p:cSld>
+    <p:spTree>
+      <p:nvGrpSpPr>
+        <p:cNvPr id="1" name=""/>
+        <p:cNvGrpSpPr/>
+        <p:nvPr/>
+      </p:nvGrpSpPr>
+      <p:grpSpPr>
+        <a:xfrm>
+          <a:off x="0" y="0"/>
+          <a:ext cx="0" cy="0"/>
+          <a:chOff x="0" y="0"/>
+          <a:chExt cx="0" cy="0"/>
+        </a:xfrm>
+      </p:grpSpPr>
+      <p:pic>
+        <p:nvPicPr>
+          <p:cNvPr id="2" name="Picture 1" descr="297px-Ruby_logo.svg.png"/>
+          <p:cNvPicPr>
+            <a:picLocks noChangeAspect="1"/>
+          </p:cNvPicPr>
+          <p:nvPr/>
+        </p:nvPicPr>
+        <p:blipFill>
+          <a:blip r:embed="rId3" cstate="print"/>
+          <a:stretch>
+            <a:fillRect/>
+          </a:stretch>
+        </p:blipFill>
+        <p:spPr>
+          <a:xfrm>
+            <a:off x="6444208" y="1412776"/>
+            <a:ext cx="2263140" cy="2263140"/>
+          </a:xfrm>
+          <a:prstGeom prst="rect">
+            <a:avLst/>
+          </a:prstGeom>
+        </p:spPr>
+      </p:pic>
     </p:spTree>
   </p:cSld>
   <p:clrMapOvr>

</xml_diff>

<commit_message>
various faces and an owl
</commit_message>
<xml_diff>
--- a/sketchbook2.pptx
+++ b/sketchbook2.pptx
@@ -15,6 +15,15 @@
     <p:sldId id="263" r:id="rId9"/>
     <p:sldId id="264" r:id="rId10"/>
     <p:sldId id="265" r:id="rId11"/>
+    <p:sldId id="266" r:id="rId12"/>
+    <p:sldId id="267" r:id="rId13"/>
+    <p:sldId id="268" r:id="rId14"/>
+    <p:sldId id="269" r:id="rId15"/>
+    <p:sldId id="270" r:id="rId16"/>
+    <p:sldId id="271" r:id="rId17"/>
+    <p:sldId id="272" r:id="rId18"/>
+    <p:sldId id="273" r:id="rId19"/>
+    <p:sldId id="274" r:id="rId20"/>
   </p:sldIdLst>
   <p:sldSz cx="9144000" cy="6858000" type="screen4x3"/>
   <p:notesSz cx="6858000" cy="9144000"/>
@@ -298,7 +307,7 @@
             <a:fld id="{A42C2479-E3BA-4ADA-A99C-BD38F112A80F}" type="datetimeFigureOut">
               <a:rPr lang="en-CA" smtClean="0"/>
               <a:pPr/>
-              <a:t>2014-05-05</a:t>
+              <a:t>2014-05-13</a:t>
             </a:fld>
             <a:endParaRPr lang="en-CA"/>
           </a:p>
@@ -465,7 +474,7 @@
             <a:fld id="{A42C2479-E3BA-4ADA-A99C-BD38F112A80F}" type="datetimeFigureOut">
               <a:rPr lang="en-CA" smtClean="0"/>
               <a:pPr/>
-              <a:t>2014-05-05</a:t>
+              <a:t>2014-05-13</a:t>
             </a:fld>
             <a:endParaRPr lang="en-CA"/>
           </a:p>
@@ -642,7 +651,7 @@
             <a:fld id="{A42C2479-E3BA-4ADA-A99C-BD38F112A80F}" type="datetimeFigureOut">
               <a:rPr lang="en-CA" smtClean="0"/>
               <a:pPr/>
-              <a:t>2014-05-05</a:t>
+              <a:t>2014-05-13</a:t>
             </a:fld>
             <a:endParaRPr lang="en-CA"/>
           </a:p>
@@ -809,7 +818,7 @@
             <a:fld id="{A42C2479-E3BA-4ADA-A99C-BD38F112A80F}" type="datetimeFigureOut">
               <a:rPr lang="en-CA" smtClean="0"/>
               <a:pPr/>
-              <a:t>2014-05-05</a:t>
+              <a:t>2014-05-13</a:t>
             </a:fld>
             <a:endParaRPr lang="en-CA"/>
           </a:p>
@@ -1052,7 +1061,7 @@
             <a:fld id="{A42C2479-E3BA-4ADA-A99C-BD38F112A80F}" type="datetimeFigureOut">
               <a:rPr lang="en-CA" smtClean="0"/>
               <a:pPr/>
-              <a:t>2014-05-05</a:t>
+              <a:t>2014-05-13</a:t>
             </a:fld>
             <a:endParaRPr lang="en-CA"/>
           </a:p>
@@ -1337,7 +1346,7 @@
             <a:fld id="{A42C2479-E3BA-4ADA-A99C-BD38F112A80F}" type="datetimeFigureOut">
               <a:rPr lang="en-CA" smtClean="0"/>
               <a:pPr/>
-              <a:t>2014-05-05</a:t>
+              <a:t>2014-05-13</a:t>
             </a:fld>
             <a:endParaRPr lang="en-CA"/>
           </a:p>
@@ -1756,7 +1765,7 @@
             <a:fld id="{A42C2479-E3BA-4ADA-A99C-BD38F112A80F}" type="datetimeFigureOut">
               <a:rPr lang="en-CA" smtClean="0"/>
               <a:pPr/>
-              <a:t>2014-05-05</a:t>
+              <a:t>2014-05-13</a:t>
             </a:fld>
             <a:endParaRPr lang="en-CA"/>
           </a:p>
@@ -1871,7 +1880,7 @@
             <a:fld id="{A42C2479-E3BA-4ADA-A99C-BD38F112A80F}" type="datetimeFigureOut">
               <a:rPr lang="en-CA" smtClean="0"/>
               <a:pPr/>
-              <a:t>2014-05-05</a:t>
+              <a:t>2014-05-13</a:t>
             </a:fld>
             <a:endParaRPr lang="en-CA"/>
           </a:p>
@@ -1963,7 +1972,7 @@
             <a:fld id="{A42C2479-E3BA-4ADA-A99C-BD38F112A80F}" type="datetimeFigureOut">
               <a:rPr lang="en-CA" smtClean="0"/>
               <a:pPr/>
-              <a:t>2014-05-05</a:t>
+              <a:t>2014-05-13</a:t>
             </a:fld>
             <a:endParaRPr lang="en-CA"/>
           </a:p>
@@ -2237,7 +2246,7 @@
             <a:fld id="{A42C2479-E3BA-4ADA-A99C-BD38F112A80F}" type="datetimeFigureOut">
               <a:rPr lang="en-CA" smtClean="0"/>
               <a:pPr/>
-              <a:t>2014-05-05</a:t>
+              <a:t>2014-05-13</a:t>
             </a:fld>
             <a:endParaRPr lang="en-CA"/>
           </a:p>
@@ -2487,7 +2496,7 @@
             <a:fld id="{A42C2479-E3BA-4ADA-A99C-BD38F112A80F}" type="datetimeFigureOut">
               <a:rPr lang="en-CA" smtClean="0"/>
               <a:pPr/>
-              <a:t>2014-05-05</a:t>
+              <a:t>2014-05-13</a:t>
             </a:fld>
             <a:endParaRPr lang="en-CA"/>
           </a:p>
@@ -2697,7 +2706,7 @@
             <a:fld id="{A42C2479-E3BA-4ADA-A99C-BD38F112A80F}" type="datetimeFigureOut">
               <a:rPr lang="en-CA" smtClean="0"/>
               <a:pPr/>
-              <a:t>2014-05-05</a:t>
+              <a:t>2014-05-13</a:t>
             </a:fld>
             <a:endParaRPr lang="en-CA"/>
           </a:p>
@@ -3119,6 +3128,494 @@
 </file>
 
 <file path=ppt/slides/slide10.xml><?xml version="1.0" encoding="utf-8"?>
+<p:sld xmlns:a="http://schemas.openxmlformats.org/drawingml/2006/main" xmlns:r="http://schemas.openxmlformats.org/officeDocument/2006/relationships" xmlns:p="http://schemas.openxmlformats.org/presentationml/2006/main">
+  <p:cSld>
+    <p:spTree>
+      <p:nvGrpSpPr>
+        <p:cNvPr id="1" name=""/>
+        <p:cNvGrpSpPr/>
+        <p:nvPr/>
+      </p:nvGrpSpPr>
+      <p:grpSpPr>
+        <a:xfrm>
+          <a:off x="0" y="0"/>
+          <a:ext cx="0" cy="0"/>
+          <a:chOff x="0" y="0"/>
+          <a:chExt cx="0" cy="0"/>
+        </a:xfrm>
+      </p:grpSpPr>
+    </p:spTree>
+  </p:cSld>
+  <p:clrMapOvr>
+    <a:masterClrMapping/>
+  </p:clrMapOvr>
+  <p:timing>
+    <p:tnLst>
+      <p:par>
+        <p:cTn id="1" dur="indefinite" restart="never" nodeType="tmRoot"/>
+      </p:par>
+    </p:tnLst>
+  </p:timing>
+</p:sld>
+</file>
+
+<file path=ppt/slides/slide11.xml><?xml version="1.0" encoding="utf-8"?>
+<p:sld xmlns:a="http://schemas.openxmlformats.org/drawingml/2006/main" xmlns:r="http://schemas.openxmlformats.org/officeDocument/2006/relationships" xmlns:p="http://schemas.openxmlformats.org/presentationml/2006/main">
+  <p:cSld>
+    <p:spTree>
+      <p:nvGrpSpPr>
+        <p:cNvPr id="1" name=""/>
+        <p:cNvGrpSpPr/>
+        <p:nvPr/>
+      </p:nvGrpSpPr>
+      <p:grpSpPr>
+        <a:xfrm>
+          <a:off x="0" y="0"/>
+          <a:ext cx="0" cy="0"/>
+          <a:chOff x="0" y="0"/>
+          <a:chExt cx="0" cy="0"/>
+        </a:xfrm>
+      </p:grpSpPr>
+    </p:spTree>
+  </p:cSld>
+  <p:clrMapOvr>
+    <a:masterClrMapping/>
+  </p:clrMapOvr>
+  <p:timing>
+    <p:tnLst>
+      <p:par>
+        <p:cTn id="1" dur="indefinite" restart="never" nodeType="tmRoot"/>
+      </p:par>
+    </p:tnLst>
+  </p:timing>
+</p:sld>
+</file>
+
+<file path=ppt/slides/slide12.xml><?xml version="1.0" encoding="utf-8"?>
+<p:sld xmlns:a="http://schemas.openxmlformats.org/drawingml/2006/main" xmlns:r="http://schemas.openxmlformats.org/officeDocument/2006/relationships" xmlns:p="http://schemas.openxmlformats.org/presentationml/2006/main">
+  <p:cSld>
+    <p:spTree>
+      <p:nvGrpSpPr>
+        <p:cNvPr id="1" name=""/>
+        <p:cNvGrpSpPr/>
+        <p:nvPr/>
+      </p:nvGrpSpPr>
+      <p:grpSpPr>
+        <a:xfrm>
+          <a:off x="0" y="0"/>
+          <a:ext cx="0" cy="0"/>
+          <a:chOff x="0" y="0"/>
+          <a:chExt cx="0" cy="0"/>
+        </a:xfrm>
+      </p:grpSpPr>
+    </p:spTree>
+  </p:cSld>
+  <p:clrMapOvr>
+    <a:masterClrMapping/>
+  </p:clrMapOvr>
+  <p:timing>
+    <p:tnLst>
+      <p:par>
+        <p:cTn id="1" dur="indefinite" restart="never" nodeType="tmRoot"/>
+      </p:par>
+    </p:tnLst>
+  </p:timing>
+</p:sld>
+</file>
+
+<file path=ppt/slides/slide13.xml><?xml version="1.0" encoding="utf-8"?>
+<p:sld xmlns:a="http://schemas.openxmlformats.org/drawingml/2006/main" xmlns:r="http://schemas.openxmlformats.org/officeDocument/2006/relationships" xmlns:p="http://schemas.openxmlformats.org/presentationml/2006/main">
+  <p:cSld>
+    <p:spTree>
+      <p:nvGrpSpPr>
+        <p:cNvPr id="1" name=""/>
+        <p:cNvGrpSpPr/>
+        <p:nvPr/>
+      </p:nvGrpSpPr>
+      <p:grpSpPr>
+        <a:xfrm>
+          <a:off x="0" y="0"/>
+          <a:ext cx="0" cy="0"/>
+          <a:chOff x="0" y="0"/>
+          <a:chExt cx="0" cy="0"/>
+        </a:xfrm>
+      </p:grpSpPr>
+    </p:spTree>
+  </p:cSld>
+  <p:clrMapOvr>
+    <a:masterClrMapping/>
+  </p:clrMapOvr>
+  <p:timing>
+    <p:tnLst>
+      <p:par>
+        <p:cTn id="1" dur="indefinite" restart="never" nodeType="tmRoot"/>
+      </p:par>
+    </p:tnLst>
+  </p:timing>
+</p:sld>
+</file>
+
+<file path=ppt/slides/slide14.xml><?xml version="1.0" encoding="utf-8"?>
+<p:sld xmlns:a="http://schemas.openxmlformats.org/drawingml/2006/main" xmlns:r="http://schemas.openxmlformats.org/officeDocument/2006/relationships" xmlns:p="http://schemas.openxmlformats.org/presentationml/2006/main">
+  <p:cSld>
+    <p:spTree>
+      <p:nvGrpSpPr>
+        <p:cNvPr id="1" name=""/>
+        <p:cNvGrpSpPr/>
+        <p:nvPr/>
+      </p:nvGrpSpPr>
+      <p:grpSpPr>
+        <a:xfrm>
+          <a:off x="0" y="0"/>
+          <a:ext cx="0" cy="0"/>
+          <a:chOff x="0" y="0"/>
+          <a:chExt cx="0" cy="0"/>
+        </a:xfrm>
+      </p:grpSpPr>
+    </p:spTree>
+  </p:cSld>
+  <p:clrMapOvr>
+    <a:masterClrMapping/>
+  </p:clrMapOvr>
+  <p:timing>
+    <p:tnLst>
+      <p:par>
+        <p:cTn id="1" dur="indefinite" restart="never" nodeType="tmRoot"/>
+      </p:par>
+    </p:tnLst>
+  </p:timing>
+</p:sld>
+</file>
+
+<file path=ppt/slides/slide15.xml><?xml version="1.0" encoding="utf-8"?>
+<p:sld xmlns:a="http://schemas.openxmlformats.org/drawingml/2006/main" xmlns:r="http://schemas.openxmlformats.org/officeDocument/2006/relationships" xmlns:p="http://schemas.openxmlformats.org/presentationml/2006/main">
+  <p:cSld>
+    <p:spTree>
+      <p:nvGrpSpPr>
+        <p:cNvPr id="1" name=""/>
+        <p:cNvGrpSpPr/>
+        <p:nvPr/>
+      </p:nvGrpSpPr>
+      <p:grpSpPr>
+        <a:xfrm>
+          <a:off x="0" y="0"/>
+          <a:ext cx="0" cy="0"/>
+          <a:chOff x="0" y="0"/>
+          <a:chExt cx="0" cy="0"/>
+        </a:xfrm>
+      </p:grpSpPr>
+    </p:spTree>
+  </p:cSld>
+  <p:clrMapOvr>
+    <a:masterClrMapping/>
+  </p:clrMapOvr>
+  <p:timing>
+    <p:tnLst>
+      <p:par>
+        <p:cTn id="1" dur="indefinite" restart="never" nodeType="tmRoot"/>
+      </p:par>
+    </p:tnLst>
+  </p:timing>
+</p:sld>
+</file>
+
+<file path=ppt/slides/slide16.xml><?xml version="1.0" encoding="utf-8"?>
+<p:sld xmlns:a="http://schemas.openxmlformats.org/drawingml/2006/main" xmlns:r="http://schemas.openxmlformats.org/officeDocument/2006/relationships" xmlns:p="http://schemas.openxmlformats.org/presentationml/2006/main">
+  <p:cSld>
+    <p:spTree>
+      <p:nvGrpSpPr>
+        <p:cNvPr id="1" name=""/>
+        <p:cNvGrpSpPr/>
+        <p:nvPr/>
+      </p:nvGrpSpPr>
+      <p:grpSpPr>
+        <a:xfrm>
+          <a:off x="0" y="0"/>
+          <a:ext cx="0" cy="0"/>
+          <a:chOff x="0" y="0"/>
+          <a:chExt cx="0" cy="0"/>
+        </a:xfrm>
+      </p:grpSpPr>
+    </p:spTree>
+  </p:cSld>
+  <p:clrMapOvr>
+    <a:masterClrMapping/>
+  </p:clrMapOvr>
+  <p:timing>
+    <p:tnLst>
+      <p:par>
+        <p:cTn id="1" dur="indefinite" restart="never" nodeType="tmRoot"/>
+      </p:par>
+    </p:tnLst>
+  </p:timing>
+</p:sld>
+</file>
+
+<file path=ppt/slides/slide17.xml><?xml version="1.0" encoding="utf-8"?>
+<p:sld xmlns:a="http://schemas.openxmlformats.org/drawingml/2006/main" xmlns:r="http://schemas.openxmlformats.org/officeDocument/2006/relationships" xmlns:p="http://schemas.openxmlformats.org/presentationml/2006/main">
+  <p:cSld>
+    <p:spTree>
+      <p:nvGrpSpPr>
+        <p:cNvPr id="1" name=""/>
+        <p:cNvGrpSpPr/>
+        <p:nvPr/>
+      </p:nvGrpSpPr>
+      <p:grpSpPr>
+        <a:xfrm>
+          <a:off x="0" y="0"/>
+          <a:ext cx="0" cy="0"/>
+          <a:chOff x="0" y="0"/>
+          <a:chExt cx="0" cy="0"/>
+        </a:xfrm>
+      </p:grpSpPr>
+      <p:sp>
+        <p:nvSpPr>
+          <p:cNvPr id="2" name="Rectangle 1"/>
+          <p:cNvSpPr/>
+          <p:nvPr/>
+        </p:nvSpPr>
+        <p:spPr>
+          <a:xfrm rot="1571905">
+            <a:off x="1956022" y="1859829"/>
+            <a:ext cx="1080120" cy="144016"/>
+          </a:xfrm>
+          <a:prstGeom prst="rect">
+            <a:avLst/>
+          </a:prstGeom>
+        </p:spPr>
+        <p:style>
+          <a:lnRef idx="2">
+            <a:schemeClr val="accent1">
+              <a:shade val="50000"/>
+            </a:schemeClr>
+          </a:lnRef>
+          <a:fillRef idx="1">
+            <a:schemeClr val="accent1"/>
+          </a:fillRef>
+          <a:effectRef idx="0">
+            <a:schemeClr val="accent1"/>
+          </a:effectRef>
+          <a:fontRef idx="minor">
+            <a:schemeClr val="lt1"/>
+          </a:fontRef>
+        </p:style>
+        <p:txBody>
+          <a:bodyPr rtlCol="0" anchor="ctr"/>
+          <a:lstStyle/>
+          <a:p>
+            <a:pPr algn="ctr"/>
+            <a:endParaRPr lang="en-CA"/>
+          </a:p>
+        </p:txBody>
+      </p:sp>
+      <p:sp>
+        <p:nvSpPr>
+          <p:cNvPr id="3" name="Rectangle 2"/>
+          <p:cNvSpPr/>
+          <p:nvPr/>
+        </p:nvSpPr>
+        <p:spPr>
+          <a:xfrm rot="19825441">
+            <a:off x="3303654" y="1849513"/>
+            <a:ext cx="1224136" cy="144016"/>
+          </a:xfrm>
+          <a:prstGeom prst="rect">
+            <a:avLst/>
+          </a:prstGeom>
+        </p:spPr>
+        <p:style>
+          <a:lnRef idx="2">
+            <a:schemeClr val="accent1">
+              <a:shade val="50000"/>
+            </a:schemeClr>
+          </a:lnRef>
+          <a:fillRef idx="1">
+            <a:schemeClr val="accent1"/>
+          </a:fillRef>
+          <a:effectRef idx="0">
+            <a:schemeClr val="accent1"/>
+          </a:effectRef>
+          <a:fontRef idx="minor">
+            <a:schemeClr val="lt1"/>
+          </a:fontRef>
+        </p:style>
+        <p:txBody>
+          <a:bodyPr rtlCol="0" anchor="ctr"/>
+          <a:lstStyle/>
+          <a:p>
+            <a:pPr algn="ctr"/>
+            <a:endParaRPr lang="en-CA"/>
+          </a:p>
+        </p:txBody>
+      </p:sp>
+      <p:sp>
+        <p:nvSpPr>
+          <p:cNvPr id="4" name="Oval 3"/>
+          <p:cNvSpPr/>
+          <p:nvPr/>
+        </p:nvSpPr>
+        <p:spPr>
+          <a:xfrm>
+            <a:off x="1907704" y="2204864"/>
+            <a:ext cx="792088" cy="504056"/>
+          </a:xfrm>
+          <a:prstGeom prst="ellipse">
+            <a:avLst/>
+          </a:prstGeom>
+        </p:spPr>
+        <p:style>
+          <a:lnRef idx="2">
+            <a:schemeClr val="accent1">
+              <a:shade val="50000"/>
+            </a:schemeClr>
+          </a:lnRef>
+          <a:fillRef idx="1">
+            <a:schemeClr val="accent1"/>
+          </a:fillRef>
+          <a:effectRef idx="0">
+            <a:schemeClr val="accent1"/>
+          </a:effectRef>
+          <a:fontRef idx="minor">
+            <a:schemeClr val="lt1"/>
+          </a:fontRef>
+        </p:style>
+        <p:txBody>
+          <a:bodyPr rtlCol="0" anchor="ctr"/>
+          <a:lstStyle/>
+          <a:p>
+            <a:pPr algn="ctr"/>
+            <a:endParaRPr lang="en-CA"/>
+          </a:p>
+        </p:txBody>
+      </p:sp>
+      <p:sp>
+        <p:nvSpPr>
+          <p:cNvPr id="5" name="Oval 4"/>
+          <p:cNvSpPr/>
+          <p:nvPr/>
+        </p:nvSpPr>
+        <p:spPr>
+          <a:xfrm>
+            <a:off x="3779912" y="2204864"/>
+            <a:ext cx="936104" cy="576064"/>
+          </a:xfrm>
+          <a:prstGeom prst="ellipse">
+            <a:avLst/>
+          </a:prstGeom>
+        </p:spPr>
+        <p:style>
+          <a:lnRef idx="2">
+            <a:schemeClr val="accent1">
+              <a:shade val="50000"/>
+            </a:schemeClr>
+          </a:lnRef>
+          <a:fillRef idx="1">
+            <a:schemeClr val="accent1"/>
+          </a:fillRef>
+          <a:effectRef idx="0">
+            <a:schemeClr val="accent1"/>
+          </a:effectRef>
+          <a:fontRef idx="minor">
+            <a:schemeClr val="lt1"/>
+          </a:fontRef>
+        </p:style>
+        <p:txBody>
+          <a:bodyPr rtlCol="0" anchor="ctr"/>
+          <a:lstStyle/>
+          <a:p>
+            <a:pPr algn="ctr"/>
+            <a:endParaRPr lang="en-CA"/>
+          </a:p>
+        </p:txBody>
+      </p:sp>
+      <p:sp>
+        <p:nvSpPr>
+          <p:cNvPr id="6" name="Rounded Rectangle 5"/>
+          <p:cNvSpPr/>
+          <p:nvPr/>
+        </p:nvSpPr>
+        <p:spPr>
+          <a:xfrm>
+            <a:off x="2771800" y="3789040"/>
+            <a:ext cx="936104" cy="1080120"/>
+          </a:xfrm>
+          <a:prstGeom prst="roundRect">
+            <a:avLst/>
+          </a:prstGeom>
+        </p:spPr>
+        <p:style>
+          <a:lnRef idx="2">
+            <a:schemeClr val="accent1">
+              <a:shade val="50000"/>
+            </a:schemeClr>
+          </a:lnRef>
+          <a:fillRef idx="1">
+            <a:schemeClr val="accent1"/>
+          </a:fillRef>
+          <a:effectRef idx="0">
+            <a:schemeClr val="accent1"/>
+          </a:effectRef>
+          <a:fontRef idx="minor">
+            <a:schemeClr val="lt1"/>
+          </a:fontRef>
+        </p:style>
+        <p:txBody>
+          <a:bodyPr rtlCol="0" anchor="ctr"/>
+          <a:lstStyle/>
+          <a:p>
+            <a:pPr algn="ctr"/>
+            <a:endParaRPr lang="en-CA"/>
+          </a:p>
+        </p:txBody>
+      </p:sp>
+    </p:spTree>
+  </p:cSld>
+  <p:clrMapOvr>
+    <a:masterClrMapping/>
+  </p:clrMapOvr>
+  <p:timing>
+    <p:tnLst>
+      <p:par>
+        <p:cTn id="1" dur="indefinite" restart="never" nodeType="tmRoot"/>
+      </p:par>
+    </p:tnLst>
+  </p:timing>
+</p:sld>
+</file>
+
+<file path=ppt/slides/slide18.xml><?xml version="1.0" encoding="utf-8"?>
+<p:sld xmlns:a="http://schemas.openxmlformats.org/drawingml/2006/main" xmlns:r="http://schemas.openxmlformats.org/officeDocument/2006/relationships" xmlns:p="http://schemas.openxmlformats.org/presentationml/2006/main">
+  <p:cSld>
+    <p:spTree>
+      <p:nvGrpSpPr>
+        <p:cNvPr id="1" name=""/>
+        <p:cNvGrpSpPr/>
+        <p:nvPr/>
+      </p:nvGrpSpPr>
+      <p:grpSpPr>
+        <a:xfrm>
+          <a:off x="0" y="0"/>
+          <a:ext cx="0" cy="0"/>
+          <a:chOff x="0" y="0"/>
+          <a:chExt cx="0" cy="0"/>
+        </a:xfrm>
+      </p:grpSpPr>
+    </p:spTree>
+  </p:cSld>
+  <p:clrMapOvr>
+    <a:masterClrMapping/>
+  </p:clrMapOvr>
+  <p:timing>
+    <p:tnLst>
+      <p:par>
+        <p:cTn id="1" dur="indefinite" restart="never" nodeType="tmRoot"/>
+      </p:par>
+    </p:tnLst>
+  </p:timing>
+</p:sld>
+</file>
+
+<file path=ppt/slides/slide19.xml><?xml version="1.0" encoding="utf-8"?>
 <p:sld xmlns:a="http://schemas.openxmlformats.org/drawingml/2006/main" xmlns:r="http://schemas.openxmlformats.org/officeDocument/2006/relationships" xmlns:p="http://schemas.openxmlformats.org/presentationml/2006/main">
   <p:cSld>
     <p:spTree>

</xml_diff>

<commit_message>
Not since the Occident
</commit_message>
<xml_diff>
--- a/sketchbook2.pptx
+++ b/sketchbook2.pptx
@@ -24,6 +24,9 @@
     <p:sldId id="272" r:id="rId18"/>
     <p:sldId id="273" r:id="rId19"/>
     <p:sldId id="274" r:id="rId20"/>
+    <p:sldId id="275" r:id="rId21"/>
+    <p:sldId id="276" r:id="rId22"/>
+    <p:sldId id="277" r:id="rId23"/>
   </p:sldIdLst>
   <p:sldSz cx="9144000" cy="6858000" type="screen4x3"/>
   <p:notesSz cx="6858000" cy="9144000"/>
@@ -307,7 +310,7 @@
             <a:fld id="{A42C2479-E3BA-4ADA-A99C-BD38F112A80F}" type="datetimeFigureOut">
               <a:rPr lang="en-CA" smtClean="0"/>
               <a:pPr/>
-              <a:t>2014-05-13</a:t>
+              <a:t>2014-05-31</a:t>
             </a:fld>
             <a:endParaRPr lang="en-CA"/>
           </a:p>
@@ -474,7 +477,7 @@
             <a:fld id="{A42C2479-E3BA-4ADA-A99C-BD38F112A80F}" type="datetimeFigureOut">
               <a:rPr lang="en-CA" smtClean="0"/>
               <a:pPr/>
-              <a:t>2014-05-13</a:t>
+              <a:t>2014-05-31</a:t>
             </a:fld>
             <a:endParaRPr lang="en-CA"/>
           </a:p>
@@ -651,7 +654,7 @@
             <a:fld id="{A42C2479-E3BA-4ADA-A99C-BD38F112A80F}" type="datetimeFigureOut">
               <a:rPr lang="en-CA" smtClean="0"/>
               <a:pPr/>
-              <a:t>2014-05-13</a:t>
+              <a:t>2014-05-31</a:t>
             </a:fld>
             <a:endParaRPr lang="en-CA"/>
           </a:p>
@@ -818,7 +821,7 @@
             <a:fld id="{A42C2479-E3BA-4ADA-A99C-BD38F112A80F}" type="datetimeFigureOut">
               <a:rPr lang="en-CA" smtClean="0"/>
               <a:pPr/>
-              <a:t>2014-05-13</a:t>
+              <a:t>2014-05-31</a:t>
             </a:fld>
             <a:endParaRPr lang="en-CA"/>
           </a:p>
@@ -1061,7 +1064,7 @@
             <a:fld id="{A42C2479-E3BA-4ADA-A99C-BD38F112A80F}" type="datetimeFigureOut">
               <a:rPr lang="en-CA" smtClean="0"/>
               <a:pPr/>
-              <a:t>2014-05-13</a:t>
+              <a:t>2014-05-31</a:t>
             </a:fld>
             <a:endParaRPr lang="en-CA"/>
           </a:p>
@@ -1346,7 +1349,7 @@
             <a:fld id="{A42C2479-E3BA-4ADA-A99C-BD38F112A80F}" type="datetimeFigureOut">
               <a:rPr lang="en-CA" smtClean="0"/>
               <a:pPr/>
-              <a:t>2014-05-13</a:t>
+              <a:t>2014-05-31</a:t>
             </a:fld>
             <a:endParaRPr lang="en-CA"/>
           </a:p>
@@ -1765,7 +1768,7 @@
             <a:fld id="{A42C2479-E3BA-4ADA-A99C-BD38F112A80F}" type="datetimeFigureOut">
               <a:rPr lang="en-CA" smtClean="0"/>
               <a:pPr/>
-              <a:t>2014-05-13</a:t>
+              <a:t>2014-05-31</a:t>
             </a:fld>
             <a:endParaRPr lang="en-CA"/>
           </a:p>
@@ -1880,7 +1883,7 @@
             <a:fld id="{A42C2479-E3BA-4ADA-A99C-BD38F112A80F}" type="datetimeFigureOut">
               <a:rPr lang="en-CA" smtClean="0"/>
               <a:pPr/>
-              <a:t>2014-05-13</a:t>
+              <a:t>2014-05-31</a:t>
             </a:fld>
             <a:endParaRPr lang="en-CA"/>
           </a:p>
@@ -1972,7 +1975,7 @@
             <a:fld id="{A42C2479-E3BA-4ADA-A99C-BD38F112A80F}" type="datetimeFigureOut">
               <a:rPr lang="en-CA" smtClean="0"/>
               <a:pPr/>
-              <a:t>2014-05-13</a:t>
+              <a:t>2014-05-31</a:t>
             </a:fld>
             <a:endParaRPr lang="en-CA"/>
           </a:p>
@@ -2246,7 +2249,7 @@
             <a:fld id="{A42C2479-E3BA-4ADA-A99C-BD38F112A80F}" type="datetimeFigureOut">
               <a:rPr lang="en-CA" smtClean="0"/>
               <a:pPr/>
-              <a:t>2014-05-13</a:t>
+              <a:t>2014-05-31</a:t>
             </a:fld>
             <a:endParaRPr lang="en-CA"/>
           </a:p>
@@ -2496,7 +2499,7 @@
             <a:fld id="{A42C2479-E3BA-4ADA-A99C-BD38F112A80F}" type="datetimeFigureOut">
               <a:rPr lang="en-CA" smtClean="0"/>
               <a:pPr/>
-              <a:t>2014-05-13</a:t>
+              <a:t>2014-05-31</a:t>
             </a:fld>
             <a:endParaRPr lang="en-CA"/>
           </a:p>
@@ -2706,7 +2709,7 @@
             <a:fld id="{A42C2479-E3BA-4ADA-A99C-BD38F112A80F}" type="datetimeFigureOut">
               <a:rPr lang="en-CA" smtClean="0"/>
               <a:pPr/>
-              <a:t>2014-05-13</a:t>
+              <a:t>2014-05-31</a:t>
             </a:fld>
             <a:endParaRPr lang="en-CA"/>
           </a:p>
@@ -3648,6 +3651,299 @@
 </file>
 
 <file path=ppt/slides/slide2.xml><?xml version="1.0" encoding="utf-8"?>
+<p:sld xmlns:a="http://schemas.openxmlformats.org/drawingml/2006/main" xmlns:r="http://schemas.openxmlformats.org/officeDocument/2006/relationships" xmlns:p="http://schemas.openxmlformats.org/presentationml/2006/main">
+  <p:cSld>
+    <p:spTree>
+      <p:nvGrpSpPr>
+        <p:cNvPr id="1" name=""/>
+        <p:cNvGrpSpPr/>
+        <p:nvPr/>
+      </p:nvGrpSpPr>
+      <p:grpSpPr>
+        <a:xfrm>
+          <a:off x="0" y="0"/>
+          <a:ext cx="0" cy="0"/>
+          <a:chOff x="0" y="0"/>
+          <a:chExt cx="0" cy="0"/>
+        </a:xfrm>
+      </p:grpSpPr>
+    </p:spTree>
+  </p:cSld>
+  <p:clrMapOvr>
+    <a:masterClrMapping/>
+  </p:clrMapOvr>
+  <p:timing>
+    <p:tnLst>
+      <p:par>
+        <p:cTn id="1" dur="indefinite" restart="never" nodeType="tmRoot"/>
+      </p:par>
+    </p:tnLst>
+  </p:timing>
+</p:sld>
+</file>
+
+<file path=ppt/slides/slide20.xml><?xml version="1.0" encoding="utf-8"?>
+<p:sld xmlns:a="http://schemas.openxmlformats.org/drawingml/2006/main" xmlns:r="http://schemas.openxmlformats.org/officeDocument/2006/relationships" xmlns:p="http://schemas.openxmlformats.org/presentationml/2006/main">
+  <p:cSld>
+    <p:spTree>
+      <p:nvGrpSpPr>
+        <p:cNvPr id="1" name=""/>
+        <p:cNvGrpSpPr/>
+        <p:nvPr/>
+      </p:nvGrpSpPr>
+      <p:grpSpPr>
+        <a:xfrm>
+          <a:off x="0" y="0"/>
+          <a:ext cx="0" cy="0"/>
+          <a:chOff x="0" y="0"/>
+          <a:chExt cx="0" cy="0"/>
+        </a:xfrm>
+      </p:grpSpPr>
+      <p:sp>
+        <p:nvSpPr>
+          <p:cNvPr id="2" name="TextBox 1"/>
+          <p:cNvSpPr txBox="1"/>
+          <p:nvPr/>
+        </p:nvSpPr>
+        <p:spPr>
+          <a:xfrm>
+            <a:off x="2339752" y="1412776"/>
+            <a:ext cx="2232248" cy="369332"/>
+          </a:xfrm>
+          <a:prstGeom prst="rect">
+            <a:avLst/>
+          </a:prstGeom>
+        </p:spPr>
+        <p:style>
+          <a:lnRef idx="2">
+            <a:schemeClr val="dk1"/>
+          </a:lnRef>
+          <a:fillRef idx="1">
+            <a:schemeClr val="lt1"/>
+          </a:fillRef>
+          <a:effectRef idx="0">
+            <a:schemeClr val="dk1"/>
+          </a:effectRef>
+          <a:fontRef idx="minor">
+            <a:schemeClr val="dk1"/>
+          </a:fontRef>
+        </p:style>
+        <p:txBody>
+          <a:bodyPr wrap="square" rtlCol="0">
+            <a:spAutoFit/>
+          </a:bodyPr>
+          <a:lstStyle/>
+          <a:p>
+            <a:pPr algn="ctr"/>
+            <a:r>
+              <a:rPr lang="en-CA" dirty="0" smtClean="0"/>
+              <a:t>Doomed</a:t>
+            </a:r>
+          </a:p>
+        </p:txBody>
+      </p:sp>
+      <p:sp>
+        <p:nvSpPr>
+          <p:cNvPr id="3" name="TextBox 2"/>
+          <p:cNvSpPr txBox="1"/>
+          <p:nvPr/>
+        </p:nvSpPr>
+        <p:spPr>
+          <a:xfrm>
+            <a:off x="2339752" y="2987660"/>
+            <a:ext cx="2232248" cy="369332"/>
+          </a:xfrm>
+          <a:prstGeom prst="rect">
+            <a:avLst/>
+          </a:prstGeom>
+        </p:spPr>
+        <p:style>
+          <a:lnRef idx="2">
+            <a:schemeClr val="dk1"/>
+          </a:lnRef>
+          <a:fillRef idx="1">
+            <a:schemeClr val="lt1"/>
+          </a:fillRef>
+          <a:effectRef idx="0">
+            <a:schemeClr val="dk1"/>
+          </a:effectRef>
+          <a:fontRef idx="minor">
+            <a:schemeClr val="dk1"/>
+          </a:fontRef>
+        </p:style>
+        <p:txBody>
+          <a:bodyPr wrap="square" rtlCol="0">
+            <a:spAutoFit/>
+          </a:bodyPr>
+          <a:lstStyle/>
+          <a:p>
+            <a:pPr algn="ctr"/>
+            <a:r>
+              <a:rPr lang="en-CA" dirty="0" err="1" smtClean="0"/>
+              <a:t>QuakeEd</a:t>
+            </a:r>
+            <a:endParaRPr lang="en-CA" dirty="0" smtClean="0"/>
+          </a:p>
+        </p:txBody>
+      </p:sp>
+      <p:sp>
+        <p:nvSpPr>
+          <p:cNvPr id="4" name="TextBox 3"/>
+          <p:cNvSpPr txBox="1"/>
+          <p:nvPr/>
+        </p:nvSpPr>
+        <p:spPr>
+          <a:xfrm>
+            <a:off x="2339752" y="4427820"/>
+            <a:ext cx="2232248" cy="369332"/>
+          </a:xfrm>
+          <a:prstGeom prst="rect">
+            <a:avLst/>
+          </a:prstGeom>
+        </p:spPr>
+        <p:style>
+          <a:lnRef idx="2">
+            <a:schemeClr val="dk1"/>
+          </a:lnRef>
+          <a:fillRef idx="1">
+            <a:schemeClr val="lt1"/>
+          </a:fillRef>
+          <a:effectRef idx="0">
+            <a:schemeClr val="dk1"/>
+          </a:effectRef>
+          <a:fontRef idx="minor">
+            <a:schemeClr val="dk1"/>
+          </a:fontRef>
+        </p:style>
+        <p:txBody>
+          <a:bodyPr wrap="square" rtlCol="0">
+            <a:spAutoFit/>
+          </a:bodyPr>
+          <a:lstStyle/>
+          <a:p>
+            <a:pPr algn="ctr"/>
+            <a:r>
+              <a:rPr lang="en-CA" dirty="0" err="1" smtClean="0"/>
+              <a:t>GtkRadiant</a:t>
+            </a:r>
+            <a:endParaRPr lang="en-CA" dirty="0" smtClean="0"/>
+          </a:p>
+        </p:txBody>
+      </p:sp>
+      <p:cxnSp>
+        <p:nvCxnSpPr>
+          <p:cNvPr id="6" name="Straight Arrow Connector 5"/>
+          <p:cNvCxnSpPr/>
+          <p:nvPr/>
+        </p:nvCxnSpPr>
+        <p:spPr>
+          <a:xfrm>
+            <a:off x="3491880" y="1916832"/>
+            <a:ext cx="0" cy="864096"/>
+          </a:xfrm>
+          <a:prstGeom prst="straightConnector1">
+            <a:avLst/>
+          </a:prstGeom>
+          <a:ln>
+            <a:tailEnd type="arrow"/>
+          </a:ln>
+        </p:spPr>
+        <p:style>
+          <a:lnRef idx="1">
+            <a:schemeClr val="accent1"/>
+          </a:lnRef>
+          <a:fillRef idx="0">
+            <a:schemeClr val="accent1"/>
+          </a:fillRef>
+          <a:effectRef idx="0">
+            <a:schemeClr val="accent1"/>
+          </a:effectRef>
+          <a:fontRef idx="minor">
+            <a:schemeClr val="tx1"/>
+          </a:fontRef>
+        </p:style>
+      </p:cxnSp>
+      <p:cxnSp>
+        <p:nvCxnSpPr>
+          <p:cNvPr id="8" name="Straight Arrow Connector 7"/>
+          <p:cNvCxnSpPr/>
+          <p:nvPr/>
+        </p:nvCxnSpPr>
+        <p:spPr>
+          <a:xfrm>
+            <a:off x="3491880" y="3429000"/>
+            <a:ext cx="0" cy="864096"/>
+          </a:xfrm>
+          <a:prstGeom prst="straightConnector1">
+            <a:avLst/>
+          </a:prstGeom>
+          <a:ln>
+            <a:tailEnd type="arrow"/>
+          </a:ln>
+        </p:spPr>
+        <p:style>
+          <a:lnRef idx="1">
+            <a:schemeClr val="accent1"/>
+          </a:lnRef>
+          <a:fillRef idx="0">
+            <a:schemeClr val="accent1"/>
+          </a:fillRef>
+          <a:effectRef idx="0">
+            <a:schemeClr val="accent1"/>
+          </a:effectRef>
+          <a:fontRef idx="minor">
+            <a:schemeClr val="tx1"/>
+          </a:fontRef>
+        </p:style>
+      </p:cxnSp>
+    </p:spTree>
+  </p:cSld>
+  <p:clrMapOvr>
+    <a:masterClrMapping/>
+  </p:clrMapOvr>
+  <p:timing>
+    <p:tnLst>
+      <p:par>
+        <p:cTn id="1" dur="indefinite" restart="never" nodeType="tmRoot"/>
+      </p:par>
+    </p:tnLst>
+  </p:timing>
+</p:sld>
+</file>
+
+<file path=ppt/slides/slide21.xml><?xml version="1.0" encoding="utf-8"?>
+<p:sld xmlns:a="http://schemas.openxmlformats.org/drawingml/2006/main" xmlns:r="http://schemas.openxmlformats.org/officeDocument/2006/relationships" xmlns:p="http://schemas.openxmlformats.org/presentationml/2006/main">
+  <p:cSld>
+    <p:spTree>
+      <p:nvGrpSpPr>
+        <p:cNvPr id="1" name=""/>
+        <p:cNvGrpSpPr/>
+        <p:nvPr/>
+      </p:nvGrpSpPr>
+      <p:grpSpPr>
+        <a:xfrm>
+          <a:off x="0" y="0"/>
+          <a:ext cx="0" cy="0"/>
+          <a:chOff x="0" y="0"/>
+          <a:chExt cx="0" cy="0"/>
+        </a:xfrm>
+      </p:grpSpPr>
+    </p:spTree>
+  </p:cSld>
+  <p:clrMapOvr>
+    <a:masterClrMapping/>
+  </p:clrMapOvr>
+  <p:timing>
+    <p:tnLst>
+      <p:par>
+        <p:cTn id="1" dur="indefinite" restart="never" nodeType="tmRoot"/>
+      </p:par>
+    </p:tnLst>
+  </p:timing>
+</p:sld>
+</file>
+
+<file path=ppt/slides/slide22.xml><?xml version="1.0" encoding="utf-8"?>
 <p:sld xmlns:a="http://schemas.openxmlformats.org/drawingml/2006/main" xmlns:r="http://schemas.openxmlformats.org/officeDocument/2006/relationships" xmlns:p="http://schemas.openxmlformats.org/presentationml/2006/main">
   <p:cSld>
     <p:spTree>

</xml_diff>

<commit_message>
Ugh Java, Peptide Cola, two random faces, and more
</commit_message>
<xml_diff>
--- a/sketchbook2.pptx
+++ b/sketchbook2.pptx
@@ -27,6 +27,15 @@
     <p:sldId id="275" r:id="rId21"/>
     <p:sldId id="276" r:id="rId22"/>
     <p:sldId id="277" r:id="rId23"/>
+    <p:sldId id="278" r:id="rId24"/>
+    <p:sldId id="279" r:id="rId25"/>
+    <p:sldId id="280" r:id="rId26"/>
+    <p:sldId id="281" r:id="rId27"/>
+    <p:sldId id="282" r:id="rId28"/>
+    <p:sldId id="283" r:id="rId29"/>
+    <p:sldId id="284" r:id="rId30"/>
+    <p:sldId id="285" r:id="rId31"/>
+    <p:sldId id="286" r:id="rId32"/>
   </p:sldIdLst>
   <p:sldSz cx="9144000" cy="6858000" type="screen4x3"/>
   <p:notesSz cx="6858000" cy="9144000"/>
@@ -310,7 +319,7 @@
             <a:fld id="{A42C2479-E3BA-4ADA-A99C-BD38F112A80F}" type="datetimeFigureOut">
               <a:rPr lang="en-CA" smtClean="0"/>
               <a:pPr/>
-              <a:t>2014-05-31</a:t>
+              <a:t>2014-06-15</a:t>
             </a:fld>
             <a:endParaRPr lang="en-CA"/>
           </a:p>
@@ -477,7 +486,7 @@
             <a:fld id="{A42C2479-E3BA-4ADA-A99C-BD38F112A80F}" type="datetimeFigureOut">
               <a:rPr lang="en-CA" smtClean="0"/>
               <a:pPr/>
-              <a:t>2014-05-31</a:t>
+              <a:t>2014-06-15</a:t>
             </a:fld>
             <a:endParaRPr lang="en-CA"/>
           </a:p>
@@ -654,7 +663,7 @@
             <a:fld id="{A42C2479-E3BA-4ADA-A99C-BD38F112A80F}" type="datetimeFigureOut">
               <a:rPr lang="en-CA" smtClean="0"/>
               <a:pPr/>
-              <a:t>2014-05-31</a:t>
+              <a:t>2014-06-15</a:t>
             </a:fld>
             <a:endParaRPr lang="en-CA"/>
           </a:p>
@@ -821,7 +830,7 @@
             <a:fld id="{A42C2479-E3BA-4ADA-A99C-BD38F112A80F}" type="datetimeFigureOut">
               <a:rPr lang="en-CA" smtClean="0"/>
               <a:pPr/>
-              <a:t>2014-05-31</a:t>
+              <a:t>2014-06-15</a:t>
             </a:fld>
             <a:endParaRPr lang="en-CA"/>
           </a:p>
@@ -1064,7 +1073,7 @@
             <a:fld id="{A42C2479-E3BA-4ADA-A99C-BD38F112A80F}" type="datetimeFigureOut">
               <a:rPr lang="en-CA" smtClean="0"/>
               <a:pPr/>
-              <a:t>2014-05-31</a:t>
+              <a:t>2014-06-15</a:t>
             </a:fld>
             <a:endParaRPr lang="en-CA"/>
           </a:p>
@@ -1349,7 +1358,7 @@
             <a:fld id="{A42C2479-E3BA-4ADA-A99C-BD38F112A80F}" type="datetimeFigureOut">
               <a:rPr lang="en-CA" smtClean="0"/>
               <a:pPr/>
-              <a:t>2014-05-31</a:t>
+              <a:t>2014-06-15</a:t>
             </a:fld>
             <a:endParaRPr lang="en-CA"/>
           </a:p>
@@ -1768,7 +1777,7 @@
             <a:fld id="{A42C2479-E3BA-4ADA-A99C-BD38F112A80F}" type="datetimeFigureOut">
               <a:rPr lang="en-CA" smtClean="0"/>
               <a:pPr/>
-              <a:t>2014-05-31</a:t>
+              <a:t>2014-06-15</a:t>
             </a:fld>
             <a:endParaRPr lang="en-CA"/>
           </a:p>
@@ -1883,7 +1892,7 @@
             <a:fld id="{A42C2479-E3BA-4ADA-A99C-BD38F112A80F}" type="datetimeFigureOut">
               <a:rPr lang="en-CA" smtClean="0"/>
               <a:pPr/>
-              <a:t>2014-05-31</a:t>
+              <a:t>2014-06-15</a:t>
             </a:fld>
             <a:endParaRPr lang="en-CA"/>
           </a:p>
@@ -1975,7 +1984,7 @@
             <a:fld id="{A42C2479-E3BA-4ADA-A99C-BD38F112A80F}" type="datetimeFigureOut">
               <a:rPr lang="en-CA" smtClean="0"/>
               <a:pPr/>
-              <a:t>2014-05-31</a:t>
+              <a:t>2014-06-15</a:t>
             </a:fld>
             <a:endParaRPr lang="en-CA"/>
           </a:p>
@@ -2249,7 +2258,7 @@
             <a:fld id="{A42C2479-E3BA-4ADA-A99C-BD38F112A80F}" type="datetimeFigureOut">
               <a:rPr lang="en-CA" smtClean="0"/>
               <a:pPr/>
-              <a:t>2014-05-31</a:t>
+              <a:t>2014-06-15</a:t>
             </a:fld>
             <a:endParaRPr lang="en-CA"/>
           </a:p>
@@ -2499,7 +2508,7 @@
             <a:fld id="{A42C2479-E3BA-4ADA-A99C-BD38F112A80F}" type="datetimeFigureOut">
               <a:rPr lang="en-CA" smtClean="0"/>
               <a:pPr/>
-              <a:t>2014-05-31</a:t>
+              <a:t>2014-06-15</a:t>
             </a:fld>
             <a:endParaRPr lang="en-CA"/>
           </a:p>
@@ -2709,7 +2718,7 @@
             <a:fld id="{A42C2479-E3BA-4ADA-A99C-BD38F112A80F}" type="datetimeFigureOut">
               <a:rPr lang="en-CA" smtClean="0"/>
               <a:pPr/>
-              <a:t>2014-05-31</a:t>
+              <a:t>2014-06-15</a:t>
             </a:fld>
             <a:endParaRPr lang="en-CA"/>
           </a:p>
@@ -3975,6 +3984,230 @@
 </p:sld>
 </file>
 
+<file path=ppt/slides/slide23.xml><?xml version="1.0" encoding="utf-8"?>
+<p:sld xmlns:a="http://schemas.openxmlformats.org/drawingml/2006/main" xmlns:r="http://schemas.openxmlformats.org/officeDocument/2006/relationships" xmlns:p="http://schemas.openxmlformats.org/presentationml/2006/main">
+  <p:cSld>
+    <p:spTree>
+      <p:nvGrpSpPr>
+        <p:cNvPr id="1" name=""/>
+        <p:cNvGrpSpPr/>
+        <p:nvPr/>
+      </p:nvGrpSpPr>
+      <p:grpSpPr>
+        <a:xfrm>
+          <a:off x="0" y="0"/>
+          <a:ext cx="0" cy="0"/>
+          <a:chOff x="0" y="0"/>
+          <a:chExt cx="0" cy="0"/>
+        </a:xfrm>
+      </p:grpSpPr>
+    </p:spTree>
+  </p:cSld>
+  <p:clrMapOvr>
+    <a:masterClrMapping/>
+  </p:clrMapOvr>
+  <p:timing>
+    <p:tnLst>
+      <p:par>
+        <p:cTn id="1" dur="indefinite" restart="never" nodeType="tmRoot"/>
+      </p:par>
+    </p:tnLst>
+  </p:timing>
+</p:sld>
+</file>
+
+<file path=ppt/slides/slide24.xml><?xml version="1.0" encoding="utf-8"?>
+<p:sld xmlns:a="http://schemas.openxmlformats.org/drawingml/2006/main" xmlns:r="http://schemas.openxmlformats.org/officeDocument/2006/relationships" xmlns:p="http://schemas.openxmlformats.org/presentationml/2006/main">
+  <p:cSld>
+    <p:spTree>
+      <p:nvGrpSpPr>
+        <p:cNvPr id="1" name=""/>
+        <p:cNvGrpSpPr/>
+        <p:nvPr/>
+      </p:nvGrpSpPr>
+      <p:grpSpPr>
+        <a:xfrm>
+          <a:off x="0" y="0"/>
+          <a:ext cx="0" cy="0"/>
+          <a:chOff x="0" y="0"/>
+          <a:chExt cx="0" cy="0"/>
+        </a:xfrm>
+      </p:grpSpPr>
+    </p:spTree>
+  </p:cSld>
+  <p:clrMapOvr>
+    <a:masterClrMapping/>
+  </p:clrMapOvr>
+  <p:timing>
+    <p:tnLst>
+      <p:par>
+        <p:cTn id="1" dur="indefinite" restart="never" nodeType="tmRoot"/>
+      </p:par>
+    </p:tnLst>
+  </p:timing>
+</p:sld>
+</file>
+
+<file path=ppt/slides/slide25.xml><?xml version="1.0" encoding="utf-8"?>
+<p:sld xmlns:a="http://schemas.openxmlformats.org/drawingml/2006/main" xmlns:r="http://schemas.openxmlformats.org/officeDocument/2006/relationships" xmlns:p="http://schemas.openxmlformats.org/presentationml/2006/main">
+  <p:cSld>
+    <p:spTree>
+      <p:nvGrpSpPr>
+        <p:cNvPr id="1" name=""/>
+        <p:cNvGrpSpPr/>
+        <p:nvPr/>
+      </p:nvGrpSpPr>
+      <p:grpSpPr>
+        <a:xfrm>
+          <a:off x="0" y="0"/>
+          <a:ext cx="0" cy="0"/>
+          <a:chOff x="0" y="0"/>
+          <a:chExt cx="0" cy="0"/>
+        </a:xfrm>
+      </p:grpSpPr>
+    </p:spTree>
+  </p:cSld>
+  <p:clrMapOvr>
+    <a:masterClrMapping/>
+  </p:clrMapOvr>
+  <p:timing>
+    <p:tnLst>
+      <p:par>
+        <p:cTn id="1" dur="indefinite" restart="never" nodeType="tmRoot"/>
+      </p:par>
+    </p:tnLst>
+  </p:timing>
+</p:sld>
+</file>
+
+<file path=ppt/slides/slide26.xml><?xml version="1.0" encoding="utf-8"?>
+<p:sld xmlns:a="http://schemas.openxmlformats.org/drawingml/2006/main" xmlns:r="http://schemas.openxmlformats.org/officeDocument/2006/relationships" xmlns:p="http://schemas.openxmlformats.org/presentationml/2006/main">
+  <p:cSld>
+    <p:spTree>
+      <p:nvGrpSpPr>
+        <p:cNvPr id="1" name=""/>
+        <p:cNvGrpSpPr/>
+        <p:nvPr/>
+      </p:nvGrpSpPr>
+      <p:grpSpPr>
+        <a:xfrm>
+          <a:off x="0" y="0"/>
+          <a:ext cx="0" cy="0"/>
+          <a:chOff x="0" y="0"/>
+          <a:chExt cx="0" cy="0"/>
+        </a:xfrm>
+      </p:grpSpPr>
+    </p:spTree>
+  </p:cSld>
+  <p:clrMapOvr>
+    <a:masterClrMapping/>
+  </p:clrMapOvr>
+  <p:timing>
+    <p:tnLst>
+      <p:par>
+        <p:cTn id="1" dur="indefinite" restart="never" nodeType="tmRoot"/>
+      </p:par>
+    </p:tnLst>
+  </p:timing>
+</p:sld>
+</file>
+
+<file path=ppt/slides/slide27.xml><?xml version="1.0" encoding="utf-8"?>
+<p:sld xmlns:a="http://schemas.openxmlformats.org/drawingml/2006/main" xmlns:r="http://schemas.openxmlformats.org/officeDocument/2006/relationships" xmlns:p="http://schemas.openxmlformats.org/presentationml/2006/main">
+  <p:cSld>
+    <p:spTree>
+      <p:nvGrpSpPr>
+        <p:cNvPr id="1" name=""/>
+        <p:cNvGrpSpPr/>
+        <p:nvPr/>
+      </p:nvGrpSpPr>
+      <p:grpSpPr>
+        <a:xfrm>
+          <a:off x="0" y="0"/>
+          <a:ext cx="0" cy="0"/>
+          <a:chOff x="0" y="0"/>
+          <a:chExt cx="0" cy="0"/>
+        </a:xfrm>
+      </p:grpSpPr>
+    </p:spTree>
+  </p:cSld>
+  <p:clrMapOvr>
+    <a:masterClrMapping/>
+  </p:clrMapOvr>
+  <p:timing>
+    <p:tnLst>
+      <p:par>
+        <p:cTn id="1" dur="indefinite" restart="never" nodeType="tmRoot"/>
+      </p:par>
+    </p:tnLst>
+  </p:timing>
+</p:sld>
+</file>
+
+<file path=ppt/slides/slide28.xml><?xml version="1.0" encoding="utf-8"?>
+<p:sld xmlns:a="http://schemas.openxmlformats.org/drawingml/2006/main" xmlns:r="http://schemas.openxmlformats.org/officeDocument/2006/relationships" xmlns:p="http://schemas.openxmlformats.org/presentationml/2006/main">
+  <p:cSld>
+    <p:spTree>
+      <p:nvGrpSpPr>
+        <p:cNvPr id="1" name=""/>
+        <p:cNvGrpSpPr/>
+        <p:nvPr/>
+      </p:nvGrpSpPr>
+      <p:grpSpPr>
+        <a:xfrm>
+          <a:off x="0" y="0"/>
+          <a:ext cx="0" cy="0"/>
+          <a:chOff x="0" y="0"/>
+          <a:chExt cx="0" cy="0"/>
+        </a:xfrm>
+      </p:grpSpPr>
+    </p:spTree>
+  </p:cSld>
+  <p:clrMapOvr>
+    <a:masterClrMapping/>
+  </p:clrMapOvr>
+  <p:timing>
+    <p:tnLst>
+      <p:par>
+        <p:cTn id="1" dur="indefinite" restart="never" nodeType="tmRoot"/>
+      </p:par>
+    </p:tnLst>
+  </p:timing>
+</p:sld>
+</file>
+
+<file path=ppt/slides/slide29.xml><?xml version="1.0" encoding="utf-8"?>
+<p:sld xmlns:a="http://schemas.openxmlformats.org/drawingml/2006/main" xmlns:r="http://schemas.openxmlformats.org/officeDocument/2006/relationships" xmlns:p="http://schemas.openxmlformats.org/presentationml/2006/main">
+  <p:cSld>
+    <p:spTree>
+      <p:nvGrpSpPr>
+        <p:cNvPr id="1" name=""/>
+        <p:cNvGrpSpPr/>
+        <p:nvPr/>
+      </p:nvGrpSpPr>
+      <p:grpSpPr>
+        <a:xfrm>
+          <a:off x="0" y="0"/>
+          <a:ext cx="0" cy="0"/>
+          <a:chOff x="0" y="0"/>
+          <a:chExt cx="0" cy="0"/>
+        </a:xfrm>
+      </p:grpSpPr>
+    </p:spTree>
+  </p:cSld>
+  <p:clrMapOvr>
+    <a:masterClrMapping/>
+  </p:clrMapOvr>
+  <p:timing>
+    <p:tnLst>
+      <p:par>
+        <p:cTn id="1" dur="indefinite" restart="never" nodeType="tmRoot"/>
+      </p:par>
+    </p:tnLst>
+  </p:timing>
+</p:sld>
+</file>
+
 <file path=ppt/slides/slide3.xml><?xml version="1.0" encoding="utf-8"?>
 <p:sld xmlns:a="http://schemas.openxmlformats.org/drawingml/2006/main" xmlns:r="http://schemas.openxmlformats.org/officeDocument/2006/relationships" xmlns:p="http://schemas.openxmlformats.org/presentationml/2006/main">
   <p:cSld>
@@ -4564,6 +4797,70 @@
           </a:p>
         </p:txBody>
       </p:sp>
+    </p:spTree>
+  </p:cSld>
+  <p:clrMapOvr>
+    <a:masterClrMapping/>
+  </p:clrMapOvr>
+  <p:timing>
+    <p:tnLst>
+      <p:par>
+        <p:cTn id="1" dur="indefinite" restart="never" nodeType="tmRoot"/>
+      </p:par>
+    </p:tnLst>
+  </p:timing>
+</p:sld>
+</file>
+
+<file path=ppt/slides/slide30.xml><?xml version="1.0" encoding="utf-8"?>
+<p:sld xmlns:a="http://schemas.openxmlformats.org/drawingml/2006/main" xmlns:r="http://schemas.openxmlformats.org/officeDocument/2006/relationships" xmlns:p="http://schemas.openxmlformats.org/presentationml/2006/main">
+  <p:cSld>
+    <p:spTree>
+      <p:nvGrpSpPr>
+        <p:cNvPr id="1" name=""/>
+        <p:cNvGrpSpPr/>
+        <p:nvPr/>
+      </p:nvGrpSpPr>
+      <p:grpSpPr>
+        <a:xfrm>
+          <a:off x="0" y="0"/>
+          <a:ext cx="0" cy="0"/>
+          <a:chOff x="0" y="0"/>
+          <a:chExt cx="0" cy="0"/>
+        </a:xfrm>
+      </p:grpSpPr>
+    </p:spTree>
+  </p:cSld>
+  <p:clrMapOvr>
+    <a:masterClrMapping/>
+  </p:clrMapOvr>
+  <p:timing>
+    <p:tnLst>
+      <p:par>
+        <p:cTn id="1" dur="indefinite" restart="never" nodeType="tmRoot"/>
+      </p:par>
+    </p:tnLst>
+  </p:timing>
+</p:sld>
+</file>
+
+<file path=ppt/slides/slide31.xml><?xml version="1.0" encoding="utf-8"?>
+<p:sld xmlns:a="http://schemas.openxmlformats.org/drawingml/2006/main" xmlns:r="http://schemas.openxmlformats.org/officeDocument/2006/relationships" xmlns:p="http://schemas.openxmlformats.org/presentationml/2006/main">
+  <p:cSld>
+    <p:spTree>
+      <p:nvGrpSpPr>
+        <p:cNvPr id="1" name=""/>
+        <p:cNvGrpSpPr/>
+        <p:nvPr/>
+      </p:nvGrpSpPr>
+      <p:grpSpPr>
+        <a:xfrm>
+          <a:off x="0" y="0"/>
+          <a:ext cx="0" cy="0"/>
+          <a:chOff x="0" y="0"/>
+          <a:chExt cx="0" cy="0"/>
+        </a:xfrm>
+      </p:grpSpPr>
     </p:spTree>
   </p:cSld>
   <p:clrMapOvr>

</xml_diff>

<commit_message>
Everything up to This Means Raw
</commit_message>
<xml_diff>
--- a/sketchbook2.pptx
+++ b/sketchbook2.pptx
@@ -42,6 +42,15 @@
     <p:sldId id="290" r:id="rId36"/>
     <p:sldId id="291" r:id="rId37"/>
     <p:sldId id="292" r:id="rId38"/>
+    <p:sldId id="293" r:id="rId39"/>
+    <p:sldId id="294" r:id="rId40"/>
+    <p:sldId id="295" r:id="rId41"/>
+    <p:sldId id="296" r:id="rId42"/>
+    <p:sldId id="297" r:id="rId43"/>
+    <p:sldId id="298" r:id="rId44"/>
+    <p:sldId id="299" r:id="rId45"/>
+    <p:sldId id="300" r:id="rId46"/>
+    <p:sldId id="301" r:id="rId47"/>
   </p:sldIdLst>
   <p:sldSz cx="9144000" cy="6858000" type="screen4x3"/>
   <p:notesSz cx="6858000" cy="9144000"/>
@@ -325,7 +334,7 @@
             <a:fld id="{A42C2479-E3BA-4ADA-A99C-BD38F112A80F}" type="datetimeFigureOut">
               <a:rPr lang="en-CA" smtClean="0"/>
               <a:pPr/>
-              <a:t>2014-06-29</a:t>
+              <a:t>2014-09-07</a:t>
             </a:fld>
             <a:endParaRPr lang="en-CA"/>
           </a:p>
@@ -492,7 +501,7 @@
             <a:fld id="{A42C2479-E3BA-4ADA-A99C-BD38F112A80F}" type="datetimeFigureOut">
               <a:rPr lang="en-CA" smtClean="0"/>
               <a:pPr/>
-              <a:t>2014-06-29</a:t>
+              <a:t>2014-09-07</a:t>
             </a:fld>
             <a:endParaRPr lang="en-CA"/>
           </a:p>
@@ -669,7 +678,7 @@
             <a:fld id="{A42C2479-E3BA-4ADA-A99C-BD38F112A80F}" type="datetimeFigureOut">
               <a:rPr lang="en-CA" smtClean="0"/>
               <a:pPr/>
-              <a:t>2014-06-29</a:t>
+              <a:t>2014-09-07</a:t>
             </a:fld>
             <a:endParaRPr lang="en-CA"/>
           </a:p>
@@ -836,7 +845,7 @@
             <a:fld id="{A42C2479-E3BA-4ADA-A99C-BD38F112A80F}" type="datetimeFigureOut">
               <a:rPr lang="en-CA" smtClean="0"/>
               <a:pPr/>
-              <a:t>2014-06-29</a:t>
+              <a:t>2014-09-07</a:t>
             </a:fld>
             <a:endParaRPr lang="en-CA"/>
           </a:p>
@@ -1079,7 +1088,7 @@
             <a:fld id="{A42C2479-E3BA-4ADA-A99C-BD38F112A80F}" type="datetimeFigureOut">
               <a:rPr lang="en-CA" smtClean="0"/>
               <a:pPr/>
-              <a:t>2014-06-29</a:t>
+              <a:t>2014-09-07</a:t>
             </a:fld>
             <a:endParaRPr lang="en-CA"/>
           </a:p>
@@ -1364,7 +1373,7 @@
             <a:fld id="{A42C2479-E3BA-4ADA-A99C-BD38F112A80F}" type="datetimeFigureOut">
               <a:rPr lang="en-CA" smtClean="0"/>
               <a:pPr/>
-              <a:t>2014-06-29</a:t>
+              <a:t>2014-09-07</a:t>
             </a:fld>
             <a:endParaRPr lang="en-CA"/>
           </a:p>
@@ -1783,7 +1792,7 @@
             <a:fld id="{A42C2479-E3BA-4ADA-A99C-BD38F112A80F}" type="datetimeFigureOut">
               <a:rPr lang="en-CA" smtClean="0"/>
               <a:pPr/>
-              <a:t>2014-06-29</a:t>
+              <a:t>2014-09-07</a:t>
             </a:fld>
             <a:endParaRPr lang="en-CA"/>
           </a:p>
@@ -1898,7 +1907,7 @@
             <a:fld id="{A42C2479-E3BA-4ADA-A99C-BD38F112A80F}" type="datetimeFigureOut">
               <a:rPr lang="en-CA" smtClean="0"/>
               <a:pPr/>
-              <a:t>2014-06-29</a:t>
+              <a:t>2014-09-07</a:t>
             </a:fld>
             <a:endParaRPr lang="en-CA"/>
           </a:p>
@@ -1990,7 +1999,7 @@
             <a:fld id="{A42C2479-E3BA-4ADA-A99C-BD38F112A80F}" type="datetimeFigureOut">
               <a:rPr lang="en-CA" smtClean="0"/>
               <a:pPr/>
-              <a:t>2014-06-29</a:t>
+              <a:t>2014-09-07</a:t>
             </a:fld>
             <a:endParaRPr lang="en-CA"/>
           </a:p>
@@ -2264,7 +2273,7 @@
             <a:fld id="{A42C2479-E3BA-4ADA-A99C-BD38F112A80F}" type="datetimeFigureOut">
               <a:rPr lang="en-CA" smtClean="0"/>
               <a:pPr/>
-              <a:t>2014-06-29</a:t>
+              <a:t>2014-09-07</a:t>
             </a:fld>
             <a:endParaRPr lang="en-CA"/>
           </a:p>
@@ -2514,7 +2523,7 @@
             <a:fld id="{A42C2479-E3BA-4ADA-A99C-BD38F112A80F}" type="datetimeFigureOut">
               <a:rPr lang="en-CA" smtClean="0"/>
               <a:pPr/>
-              <a:t>2014-06-29</a:t>
+              <a:t>2014-09-07</a:t>
             </a:fld>
             <a:endParaRPr lang="en-CA"/>
           </a:p>
@@ -2724,7 +2733,7 @@
             <a:fld id="{A42C2479-E3BA-4ADA-A99C-BD38F112A80F}" type="datetimeFigureOut">
               <a:rPr lang="en-CA" smtClean="0"/>
               <a:pPr/>
-              <a:t>2014-06-29</a:t>
+              <a:t>2014-09-07</a:t>
             </a:fld>
             <a:endParaRPr lang="en-CA"/>
           </a:p>
@@ -5074,7 +5083,327 @@
 </p:sld>
 </file>
 
+<file path=ppt/slides/slide38.xml><?xml version="1.0" encoding="utf-8"?>
+<p:sld xmlns:a="http://schemas.openxmlformats.org/drawingml/2006/main" xmlns:r="http://schemas.openxmlformats.org/officeDocument/2006/relationships" xmlns:p="http://schemas.openxmlformats.org/presentationml/2006/main">
+  <p:cSld>
+    <p:spTree>
+      <p:nvGrpSpPr>
+        <p:cNvPr id="1" name=""/>
+        <p:cNvGrpSpPr/>
+        <p:nvPr/>
+      </p:nvGrpSpPr>
+      <p:grpSpPr>
+        <a:xfrm>
+          <a:off x="0" y="0"/>
+          <a:ext cx="0" cy="0"/>
+          <a:chOff x="0" y="0"/>
+          <a:chExt cx="0" cy="0"/>
+        </a:xfrm>
+      </p:grpSpPr>
+    </p:spTree>
+  </p:cSld>
+  <p:clrMapOvr>
+    <a:masterClrMapping/>
+  </p:clrMapOvr>
+  <p:timing>
+    <p:tnLst>
+      <p:par>
+        <p:cTn id="1" dur="indefinite" restart="never" nodeType="tmRoot"/>
+      </p:par>
+    </p:tnLst>
+  </p:timing>
+</p:sld>
+</file>
+
+<file path=ppt/slides/slide39.xml><?xml version="1.0" encoding="utf-8"?>
+<p:sld xmlns:a="http://schemas.openxmlformats.org/drawingml/2006/main" xmlns:r="http://schemas.openxmlformats.org/officeDocument/2006/relationships" xmlns:p="http://schemas.openxmlformats.org/presentationml/2006/main">
+  <p:cSld>
+    <p:spTree>
+      <p:nvGrpSpPr>
+        <p:cNvPr id="1" name=""/>
+        <p:cNvGrpSpPr/>
+        <p:nvPr/>
+      </p:nvGrpSpPr>
+      <p:grpSpPr>
+        <a:xfrm>
+          <a:off x="0" y="0"/>
+          <a:ext cx="0" cy="0"/>
+          <a:chOff x="0" y="0"/>
+          <a:chExt cx="0" cy="0"/>
+        </a:xfrm>
+      </p:grpSpPr>
+    </p:spTree>
+  </p:cSld>
+  <p:clrMapOvr>
+    <a:masterClrMapping/>
+  </p:clrMapOvr>
+  <p:timing>
+    <p:tnLst>
+      <p:par>
+        <p:cTn id="1" dur="indefinite" restart="never" nodeType="tmRoot"/>
+      </p:par>
+    </p:tnLst>
+  </p:timing>
+</p:sld>
+</file>
+
 <file path=ppt/slides/slide4.xml><?xml version="1.0" encoding="utf-8"?>
+<p:sld xmlns:a="http://schemas.openxmlformats.org/drawingml/2006/main" xmlns:r="http://schemas.openxmlformats.org/officeDocument/2006/relationships" xmlns:p="http://schemas.openxmlformats.org/presentationml/2006/main">
+  <p:cSld>
+    <p:spTree>
+      <p:nvGrpSpPr>
+        <p:cNvPr id="1" name=""/>
+        <p:cNvGrpSpPr/>
+        <p:nvPr/>
+      </p:nvGrpSpPr>
+      <p:grpSpPr>
+        <a:xfrm>
+          <a:off x="0" y="0"/>
+          <a:ext cx="0" cy="0"/>
+          <a:chOff x="0" y="0"/>
+          <a:chExt cx="0" cy="0"/>
+        </a:xfrm>
+      </p:grpSpPr>
+    </p:spTree>
+  </p:cSld>
+  <p:clrMapOvr>
+    <a:masterClrMapping/>
+  </p:clrMapOvr>
+  <p:timing>
+    <p:tnLst>
+      <p:par>
+        <p:cTn id="1" dur="indefinite" restart="never" nodeType="tmRoot"/>
+      </p:par>
+    </p:tnLst>
+  </p:timing>
+</p:sld>
+</file>
+
+<file path=ppt/slides/slide40.xml><?xml version="1.0" encoding="utf-8"?>
+<p:sld xmlns:a="http://schemas.openxmlformats.org/drawingml/2006/main" xmlns:r="http://schemas.openxmlformats.org/officeDocument/2006/relationships" xmlns:p="http://schemas.openxmlformats.org/presentationml/2006/main">
+  <p:cSld>
+    <p:spTree>
+      <p:nvGrpSpPr>
+        <p:cNvPr id="1" name=""/>
+        <p:cNvGrpSpPr/>
+        <p:nvPr/>
+      </p:nvGrpSpPr>
+      <p:grpSpPr>
+        <a:xfrm>
+          <a:off x="0" y="0"/>
+          <a:ext cx="0" cy="0"/>
+          <a:chOff x="0" y="0"/>
+          <a:chExt cx="0" cy="0"/>
+        </a:xfrm>
+      </p:grpSpPr>
+    </p:spTree>
+  </p:cSld>
+  <p:clrMapOvr>
+    <a:masterClrMapping/>
+  </p:clrMapOvr>
+  <p:timing>
+    <p:tnLst>
+      <p:par>
+        <p:cTn id="1" dur="indefinite" restart="never" nodeType="tmRoot"/>
+      </p:par>
+    </p:tnLst>
+  </p:timing>
+</p:sld>
+</file>
+
+<file path=ppt/slides/slide41.xml><?xml version="1.0" encoding="utf-8"?>
+<p:sld xmlns:a="http://schemas.openxmlformats.org/drawingml/2006/main" xmlns:r="http://schemas.openxmlformats.org/officeDocument/2006/relationships" xmlns:p="http://schemas.openxmlformats.org/presentationml/2006/main">
+  <p:cSld>
+    <p:spTree>
+      <p:nvGrpSpPr>
+        <p:cNvPr id="1" name=""/>
+        <p:cNvGrpSpPr/>
+        <p:nvPr/>
+      </p:nvGrpSpPr>
+      <p:grpSpPr>
+        <a:xfrm>
+          <a:off x="0" y="0"/>
+          <a:ext cx="0" cy="0"/>
+          <a:chOff x="0" y="0"/>
+          <a:chExt cx="0" cy="0"/>
+        </a:xfrm>
+      </p:grpSpPr>
+    </p:spTree>
+  </p:cSld>
+  <p:clrMapOvr>
+    <a:masterClrMapping/>
+  </p:clrMapOvr>
+  <p:timing>
+    <p:tnLst>
+      <p:par>
+        <p:cTn id="1" dur="indefinite" restart="never" nodeType="tmRoot"/>
+      </p:par>
+    </p:tnLst>
+  </p:timing>
+</p:sld>
+</file>
+
+<file path=ppt/slides/slide42.xml><?xml version="1.0" encoding="utf-8"?>
+<p:sld xmlns:a="http://schemas.openxmlformats.org/drawingml/2006/main" xmlns:r="http://schemas.openxmlformats.org/officeDocument/2006/relationships" xmlns:p="http://schemas.openxmlformats.org/presentationml/2006/main">
+  <p:cSld>
+    <p:spTree>
+      <p:nvGrpSpPr>
+        <p:cNvPr id="1" name=""/>
+        <p:cNvGrpSpPr/>
+        <p:nvPr/>
+      </p:nvGrpSpPr>
+      <p:grpSpPr>
+        <a:xfrm>
+          <a:off x="0" y="0"/>
+          <a:ext cx="0" cy="0"/>
+          <a:chOff x="0" y="0"/>
+          <a:chExt cx="0" cy="0"/>
+        </a:xfrm>
+      </p:grpSpPr>
+    </p:spTree>
+  </p:cSld>
+  <p:clrMapOvr>
+    <a:masterClrMapping/>
+  </p:clrMapOvr>
+  <p:timing>
+    <p:tnLst>
+      <p:par>
+        <p:cTn id="1" dur="indefinite" restart="never" nodeType="tmRoot"/>
+      </p:par>
+    </p:tnLst>
+  </p:timing>
+</p:sld>
+</file>
+
+<file path=ppt/slides/slide43.xml><?xml version="1.0" encoding="utf-8"?>
+<p:sld xmlns:a="http://schemas.openxmlformats.org/drawingml/2006/main" xmlns:r="http://schemas.openxmlformats.org/officeDocument/2006/relationships" xmlns:p="http://schemas.openxmlformats.org/presentationml/2006/main">
+  <p:cSld>
+    <p:spTree>
+      <p:nvGrpSpPr>
+        <p:cNvPr id="1" name=""/>
+        <p:cNvGrpSpPr/>
+        <p:nvPr/>
+      </p:nvGrpSpPr>
+      <p:grpSpPr>
+        <a:xfrm>
+          <a:off x="0" y="0"/>
+          <a:ext cx="0" cy="0"/>
+          <a:chOff x="0" y="0"/>
+          <a:chExt cx="0" cy="0"/>
+        </a:xfrm>
+      </p:grpSpPr>
+    </p:spTree>
+  </p:cSld>
+  <p:clrMapOvr>
+    <a:masterClrMapping/>
+  </p:clrMapOvr>
+  <p:timing>
+    <p:tnLst>
+      <p:par>
+        <p:cTn id="1" dur="indefinite" restart="never" nodeType="tmRoot"/>
+      </p:par>
+    </p:tnLst>
+  </p:timing>
+</p:sld>
+</file>
+
+<file path=ppt/slides/slide44.xml><?xml version="1.0" encoding="utf-8"?>
+<p:sld xmlns:a="http://schemas.openxmlformats.org/drawingml/2006/main" xmlns:r="http://schemas.openxmlformats.org/officeDocument/2006/relationships" xmlns:p="http://schemas.openxmlformats.org/presentationml/2006/main">
+  <p:cSld>
+    <p:spTree>
+      <p:nvGrpSpPr>
+        <p:cNvPr id="1" name=""/>
+        <p:cNvGrpSpPr/>
+        <p:nvPr/>
+      </p:nvGrpSpPr>
+      <p:grpSpPr>
+        <a:xfrm>
+          <a:off x="0" y="0"/>
+          <a:ext cx="0" cy="0"/>
+          <a:chOff x="0" y="0"/>
+          <a:chExt cx="0" cy="0"/>
+        </a:xfrm>
+      </p:grpSpPr>
+    </p:spTree>
+  </p:cSld>
+  <p:clrMapOvr>
+    <a:masterClrMapping/>
+  </p:clrMapOvr>
+  <p:timing>
+    <p:tnLst>
+      <p:par>
+        <p:cTn id="1" dur="indefinite" restart="never" nodeType="tmRoot"/>
+      </p:par>
+    </p:tnLst>
+  </p:timing>
+</p:sld>
+</file>
+
+<file path=ppt/slides/slide45.xml><?xml version="1.0" encoding="utf-8"?>
+<p:sld xmlns:a="http://schemas.openxmlformats.org/drawingml/2006/main" xmlns:r="http://schemas.openxmlformats.org/officeDocument/2006/relationships" xmlns:p="http://schemas.openxmlformats.org/presentationml/2006/main">
+  <p:cSld>
+    <p:spTree>
+      <p:nvGrpSpPr>
+        <p:cNvPr id="1" name=""/>
+        <p:cNvGrpSpPr/>
+        <p:nvPr/>
+      </p:nvGrpSpPr>
+      <p:grpSpPr>
+        <a:xfrm>
+          <a:off x="0" y="0"/>
+          <a:ext cx="0" cy="0"/>
+          <a:chOff x="0" y="0"/>
+          <a:chExt cx="0" cy="0"/>
+        </a:xfrm>
+      </p:grpSpPr>
+      <p:pic>
+        <p:nvPicPr>
+          <p:cNvPr id="65538" name="Picture 2"/>
+          <p:cNvPicPr>
+            <a:picLocks noChangeAspect="1" noChangeArrowheads="1"/>
+          </p:cNvPicPr>
+          <p:nvPr/>
+        </p:nvPicPr>
+        <p:blipFill>
+          <a:blip r:embed="rId3" cstate="print"/>
+          <a:srcRect/>
+          <a:stretch>
+            <a:fillRect/>
+          </a:stretch>
+        </p:blipFill>
+        <p:spPr bwMode="auto">
+          <a:xfrm>
+            <a:off x="3203848" y="764705"/>
+            <a:ext cx="2004647" cy="1872208"/>
+          </a:xfrm>
+          <a:prstGeom prst="rect">
+            <a:avLst/>
+          </a:prstGeom>
+          <a:noFill/>
+          <a:ln w="9525">
+            <a:noFill/>
+            <a:miter lim="800000"/>
+            <a:headEnd/>
+            <a:tailEnd/>
+          </a:ln>
+        </p:spPr>
+      </p:pic>
+    </p:spTree>
+  </p:cSld>
+  <p:clrMapOvr>
+    <a:masterClrMapping/>
+  </p:clrMapOvr>
+  <p:timing>
+    <p:tnLst>
+      <p:par>
+        <p:cTn id="1" dur="indefinite" restart="never" nodeType="tmRoot"/>
+      </p:par>
+    </p:tnLst>
+  </p:timing>
+</p:sld>
+</file>
+
+<file path=ppt/slides/slide46.xml><?xml version="1.0" encoding="utf-8"?>
 <p:sld xmlns:a="http://schemas.openxmlformats.org/drawingml/2006/main" xmlns:r="http://schemas.openxmlformats.org/officeDocument/2006/relationships" xmlns:p="http://schemas.openxmlformats.org/presentationml/2006/main">
   <p:cSld>
     <p:spTree>

</xml_diff>